<commit_message>
committing scripts and logs and poster
</commit_message>
<xml_diff>
--- a/docs/Poster.pptx
+++ b/docs/Poster.pptx
@@ -2,7 +2,7 @@
 <file path=ppt/presentation.xml><?xml version="1.0" encoding="utf-8"?>
 <p:presentation xmlns:a="http://schemas.openxmlformats.org/drawingml/2006/main" xmlns:r="http://schemas.openxmlformats.org/officeDocument/2006/relationships" xmlns:p="http://schemas.openxmlformats.org/presentationml/2006/main" saveSubsetFonts="1" autoCompressPictures="0">
   <p:sldMasterIdLst>
-    <p:sldMasterId id="2147483672" r:id="rId1"/>
+    <p:sldMasterId id="2147483708" r:id="rId1"/>
   </p:sldMasterIdLst>
   <p:notesMasterIdLst>
     <p:notesMasterId r:id="rId3"/>
@@ -16,8 +16,8 @@
     <a:defPPr>
       <a:defRPr lang="en-US"/>
     </a:defPPr>
-    <a:lvl1pPr marL="0" algn="l" defTabSz="4389120" rtl="0" eaLnBrk="1" latinLnBrk="0" hangingPunct="1">
-      <a:defRPr sz="8640" kern="1200">
+    <a:lvl1pPr marL="0" algn="l" defTabSz="4189139" rtl="0" eaLnBrk="1" latinLnBrk="0" hangingPunct="1">
+      <a:defRPr sz="8247" kern="1200">
         <a:solidFill>
           <a:schemeClr val="tx1"/>
         </a:solidFill>
@@ -26,8 +26,8 @@
         <a:cs typeface="+mn-cs"/>
       </a:defRPr>
     </a:lvl1pPr>
-    <a:lvl2pPr marL="2194560" algn="l" defTabSz="4389120" rtl="0" eaLnBrk="1" latinLnBrk="0" hangingPunct="1">
-      <a:defRPr sz="8640" kern="1200">
+    <a:lvl2pPr marL="2094570" algn="l" defTabSz="4189139" rtl="0" eaLnBrk="1" latinLnBrk="0" hangingPunct="1">
+      <a:defRPr sz="8247" kern="1200">
         <a:solidFill>
           <a:schemeClr val="tx1"/>
         </a:solidFill>
@@ -36,8 +36,8 @@
         <a:cs typeface="+mn-cs"/>
       </a:defRPr>
     </a:lvl2pPr>
-    <a:lvl3pPr marL="4389120" algn="l" defTabSz="4389120" rtl="0" eaLnBrk="1" latinLnBrk="0" hangingPunct="1">
-      <a:defRPr sz="8640" kern="1200">
+    <a:lvl3pPr marL="4189139" algn="l" defTabSz="4189139" rtl="0" eaLnBrk="1" latinLnBrk="0" hangingPunct="1">
+      <a:defRPr sz="8247" kern="1200">
         <a:solidFill>
           <a:schemeClr val="tx1"/>
         </a:solidFill>
@@ -46,8 +46,8 @@
         <a:cs typeface="+mn-cs"/>
       </a:defRPr>
     </a:lvl3pPr>
-    <a:lvl4pPr marL="6583680" algn="l" defTabSz="4389120" rtl="0" eaLnBrk="1" latinLnBrk="0" hangingPunct="1">
-      <a:defRPr sz="8640" kern="1200">
+    <a:lvl4pPr marL="6283709" algn="l" defTabSz="4189139" rtl="0" eaLnBrk="1" latinLnBrk="0" hangingPunct="1">
+      <a:defRPr sz="8247" kern="1200">
         <a:solidFill>
           <a:schemeClr val="tx1"/>
         </a:solidFill>
@@ -56,8 +56,8 @@
         <a:cs typeface="+mn-cs"/>
       </a:defRPr>
     </a:lvl4pPr>
-    <a:lvl5pPr marL="8778240" algn="l" defTabSz="4389120" rtl="0" eaLnBrk="1" latinLnBrk="0" hangingPunct="1">
-      <a:defRPr sz="8640" kern="1200">
+    <a:lvl5pPr marL="8378278" algn="l" defTabSz="4189139" rtl="0" eaLnBrk="1" latinLnBrk="0" hangingPunct="1">
+      <a:defRPr sz="8247" kern="1200">
         <a:solidFill>
           <a:schemeClr val="tx1"/>
         </a:solidFill>
@@ -66,8 +66,8 @@
         <a:cs typeface="+mn-cs"/>
       </a:defRPr>
     </a:lvl5pPr>
-    <a:lvl6pPr marL="10972800" algn="l" defTabSz="4389120" rtl="0" eaLnBrk="1" latinLnBrk="0" hangingPunct="1">
-      <a:defRPr sz="8640" kern="1200">
+    <a:lvl6pPr marL="10472848" algn="l" defTabSz="4189139" rtl="0" eaLnBrk="1" latinLnBrk="0" hangingPunct="1">
+      <a:defRPr sz="8247" kern="1200">
         <a:solidFill>
           <a:schemeClr val="tx1"/>
         </a:solidFill>
@@ -76,8 +76,8 @@
         <a:cs typeface="+mn-cs"/>
       </a:defRPr>
     </a:lvl6pPr>
-    <a:lvl7pPr marL="13167360" algn="l" defTabSz="4389120" rtl="0" eaLnBrk="1" latinLnBrk="0" hangingPunct="1">
-      <a:defRPr sz="8640" kern="1200">
+    <a:lvl7pPr marL="12567418" algn="l" defTabSz="4189139" rtl="0" eaLnBrk="1" latinLnBrk="0" hangingPunct="1">
+      <a:defRPr sz="8247" kern="1200">
         <a:solidFill>
           <a:schemeClr val="tx1"/>
         </a:solidFill>
@@ -86,8 +86,8 @@
         <a:cs typeface="+mn-cs"/>
       </a:defRPr>
     </a:lvl7pPr>
-    <a:lvl8pPr marL="15361920" algn="l" defTabSz="4389120" rtl="0" eaLnBrk="1" latinLnBrk="0" hangingPunct="1">
-      <a:defRPr sz="8640" kern="1200">
+    <a:lvl8pPr marL="14661989" algn="l" defTabSz="4189139" rtl="0" eaLnBrk="1" latinLnBrk="0" hangingPunct="1">
+      <a:defRPr sz="8247" kern="1200">
         <a:solidFill>
           <a:schemeClr val="tx1"/>
         </a:solidFill>
@@ -96,8 +96,8 @@
         <a:cs typeface="+mn-cs"/>
       </a:defRPr>
     </a:lvl8pPr>
-    <a:lvl9pPr marL="17556480" algn="l" defTabSz="4389120" rtl="0" eaLnBrk="1" latinLnBrk="0" hangingPunct="1">
-      <a:defRPr sz="8640" kern="1200">
+    <a:lvl9pPr marL="16756558" algn="l" defTabSz="4189139" rtl="0" eaLnBrk="1" latinLnBrk="0" hangingPunct="1">
+      <a:defRPr sz="8247" kern="1200">
         <a:solidFill>
           <a:schemeClr val="tx1"/>
         </a:solidFill>
@@ -110,12 +110,12 @@
   <p:extLst>
     <p:ext uri="{EFAFB233-063F-42B5-8137-9DF3F51BA10A}">
       <p15:sldGuideLst xmlns:p15="http://schemas.microsoft.com/office/powerpoint/2012/main">
-        <p15:guide id="1" orient="horz" pos="10368">
+        <p15:guide id="1" orient="horz" pos="10368" userDrawn="1">
           <p15:clr>
             <a:srgbClr val="A4A3A4"/>
           </p15:clr>
         </p15:guide>
-        <p15:guide id="2" pos="13824">
+        <p15:guide id="2" pos="13824" userDrawn="1">
           <p15:clr>
             <a:srgbClr val="A4A3A4"/>
           </p15:clr>
@@ -209,7 +209,7 @@
             <a:fld id="{D96D5894-DD96-264F-A4DE-BF2249B7F36F}" type="datetimeFigureOut">
               <a:rPr lang="en-US" smtClean="0"/>
               <a:pPr/>
-              <a:t>12/1/2015</a:t>
+              <a:t>12/5/2015</a:t>
             </a:fld>
             <a:endParaRPr lang="en-US"/>
           </a:p>
@@ -384,8 +384,8 @@
   </p:cSld>
   <p:clrMap bg1="lt1" tx1="dk1" bg2="lt2" tx2="dk2" accent1="accent1" accent2="accent2" accent3="accent3" accent4="accent4" accent5="accent5" accent6="accent6" hlink="hlink" folHlink="folHlink"/>
   <p:notesStyle>
-    <a:lvl1pPr marL="0" algn="l" defTabSz="4389120" rtl="0" eaLnBrk="1" latinLnBrk="0" hangingPunct="1">
-      <a:defRPr sz="5760" kern="1200">
+    <a:lvl1pPr marL="0" algn="l" defTabSz="4189139" rtl="0" eaLnBrk="1" latinLnBrk="0" hangingPunct="1">
+      <a:defRPr sz="5498" kern="1200">
         <a:solidFill>
           <a:schemeClr val="tx1"/>
         </a:solidFill>
@@ -394,8 +394,8 @@
         <a:cs typeface="+mn-cs"/>
       </a:defRPr>
     </a:lvl1pPr>
-    <a:lvl2pPr marL="2194560" algn="l" defTabSz="4389120" rtl="0" eaLnBrk="1" latinLnBrk="0" hangingPunct="1">
-      <a:defRPr sz="5760" kern="1200">
+    <a:lvl2pPr marL="2094570" algn="l" defTabSz="4189139" rtl="0" eaLnBrk="1" latinLnBrk="0" hangingPunct="1">
+      <a:defRPr sz="5498" kern="1200">
         <a:solidFill>
           <a:schemeClr val="tx1"/>
         </a:solidFill>
@@ -404,8 +404,8 @@
         <a:cs typeface="+mn-cs"/>
       </a:defRPr>
     </a:lvl2pPr>
-    <a:lvl3pPr marL="4389120" algn="l" defTabSz="4389120" rtl="0" eaLnBrk="1" latinLnBrk="0" hangingPunct="1">
-      <a:defRPr sz="5760" kern="1200">
+    <a:lvl3pPr marL="4189139" algn="l" defTabSz="4189139" rtl="0" eaLnBrk="1" latinLnBrk="0" hangingPunct="1">
+      <a:defRPr sz="5498" kern="1200">
         <a:solidFill>
           <a:schemeClr val="tx1"/>
         </a:solidFill>
@@ -414,8 +414,8 @@
         <a:cs typeface="+mn-cs"/>
       </a:defRPr>
     </a:lvl3pPr>
-    <a:lvl4pPr marL="6583680" algn="l" defTabSz="4389120" rtl="0" eaLnBrk="1" latinLnBrk="0" hangingPunct="1">
-      <a:defRPr sz="5760" kern="1200">
+    <a:lvl4pPr marL="6283709" algn="l" defTabSz="4189139" rtl="0" eaLnBrk="1" latinLnBrk="0" hangingPunct="1">
+      <a:defRPr sz="5498" kern="1200">
         <a:solidFill>
           <a:schemeClr val="tx1"/>
         </a:solidFill>
@@ -424,8 +424,8 @@
         <a:cs typeface="+mn-cs"/>
       </a:defRPr>
     </a:lvl4pPr>
-    <a:lvl5pPr marL="8778240" algn="l" defTabSz="4389120" rtl="0" eaLnBrk="1" latinLnBrk="0" hangingPunct="1">
-      <a:defRPr sz="5760" kern="1200">
+    <a:lvl5pPr marL="8378278" algn="l" defTabSz="4189139" rtl="0" eaLnBrk="1" latinLnBrk="0" hangingPunct="1">
+      <a:defRPr sz="5498" kern="1200">
         <a:solidFill>
           <a:schemeClr val="tx1"/>
         </a:solidFill>
@@ -434,8 +434,8 @@
         <a:cs typeface="+mn-cs"/>
       </a:defRPr>
     </a:lvl5pPr>
-    <a:lvl6pPr marL="10972800" algn="l" defTabSz="4389120" rtl="0" eaLnBrk="1" latinLnBrk="0" hangingPunct="1">
-      <a:defRPr sz="5760" kern="1200">
+    <a:lvl6pPr marL="10472848" algn="l" defTabSz="4189139" rtl="0" eaLnBrk="1" latinLnBrk="0" hangingPunct="1">
+      <a:defRPr sz="5498" kern="1200">
         <a:solidFill>
           <a:schemeClr val="tx1"/>
         </a:solidFill>
@@ -444,8 +444,8 @@
         <a:cs typeface="+mn-cs"/>
       </a:defRPr>
     </a:lvl6pPr>
-    <a:lvl7pPr marL="13167360" algn="l" defTabSz="4389120" rtl="0" eaLnBrk="1" latinLnBrk="0" hangingPunct="1">
-      <a:defRPr sz="5760" kern="1200">
+    <a:lvl7pPr marL="12567418" algn="l" defTabSz="4189139" rtl="0" eaLnBrk="1" latinLnBrk="0" hangingPunct="1">
+      <a:defRPr sz="5498" kern="1200">
         <a:solidFill>
           <a:schemeClr val="tx1"/>
         </a:solidFill>
@@ -454,8 +454,8 @@
         <a:cs typeface="+mn-cs"/>
       </a:defRPr>
     </a:lvl7pPr>
-    <a:lvl8pPr marL="15361920" algn="l" defTabSz="4389120" rtl="0" eaLnBrk="1" latinLnBrk="0" hangingPunct="1">
-      <a:defRPr sz="5760" kern="1200">
+    <a:lvl8pPr marL="14661989" algn="l" defTabSz="4189139" rtl="0" eaLnBrk="1" latinLnBrk="0" hangingPunct="1">
+      <a:defRPr sz="5498" kern="1200">
         <a:solidFill>
           <a:schemeClr val="tx1"/>
         </a:solidFill>
@@ -464,8 +464,8 @@
         <a:cs typeface="+mn-cs"/>
       </a:defRPr>
     </a:lvl8pPr>
-    <a:lvl9pPr marL="17556480" algn="l" defTabSz="4389120" rtl="0" eaLnBrk="1" latinLnBrk="0" hangingPunct="1">
-      <a:defRPr sz="5760" kern="1200">
+    <a:lvl9pPr marL="16756558" algn="l" defTabSz="4189139" rtl="0" eaLnBrk="1" latinLnBrk="0" hangingPunct="1">
+      <a:defRPr sz="5498" kern="1200">
         <a:solidFill>
           <a:schemeClr val="tx1"/>
         </a:solidFill>
@@ -505,7 +505,12 @@
             <p:ph type="sldImg"/>
           </p:nvPr>
         </p:nvSpPr>
-        <p:spPr/>
+        <p:spPr>
+          <a:xfrm>
+            <a:off x="1371600" y="1143000"/>
+            <a:ext cx="4114800" cy="3086100"/>
+          </a:xfrm>
+        </p:spPr>
       </p:sp>
       <p:sp>
         <p:nvSpPr>
@@ -522,7 +527,7 @@
           <a:bodyPr/>
           <a:lstStyle/>
           <a:p>
-            <a:endParaRPr lang="en-US"/>
+            <a:endParaRPr lang="en-US" dirty="0"/>
           </a:p>
         </p:txBody>
       </p:sp>
@@ -695,7 +700,7 @@
             <a:fld id="{7869E4BF-B381-8644-AA46-686D076790DE}" type="datetimeFigureOut">
               <a:rPr lang="en-US" smtClean="0"/>
               <a:pPr/>
-              <a:t>12/1/2015</a:t>
+              <a:t>12/5/2015</a:t>
             </a:fld>
             <a:endParaRPr lang="en-US"/>
           </a:p>
@@ -747,7 +752,7 @@
     </p:spTree>
     <p:extLst>
       <p:ext uri="{BB962C8B-B14F-4D97-AF65-F5344CB8AC3E}">
-        <p14:creationId xmlns:p14="http://schemas.microsoft.com/office/powerpoint/2010/main" val="1712546452"/>
+        <p14:creationId xmlns:p14="http://schemas.microsoft.com/office/powerpoint/2010/main" val="1061930326"/>
       </p:ext>
     </p:extLst>
   </p:cSld>
@@ -867,7 +872,7 @@
             <a:fld id="{7869E4BF-B381-8644-AA46-686D076790DE}" type="datetimeFigureOut">
               <a:rPr lang="en-US" smtClean="0"/>
               <a:pPr/>
-              <a:t>12/1/2015</a:t>
+              <a:t>12/5/2015</a:t>
             </a:fld>
             <a:endParaRPr lang="en-US"/>
           </a:p>
@@ -919,7 +924,7 @@
     </p:spTree>
     <p:extLst>
       <p:ext uri="{BB962C8B-B14F-4D97-AF65-F5344CB8AC3E}">
-        <p14:creationId xmlns:p14="http://schemas.microsoft.com/office/powerpoint/2010/main" val="1442770293"/>
+        <p14:creationId xmlns:p14="http://schemas.microsoft.com/office/powerpoint/2010/main" val="1191758094"/>
       </p:ext>
     </p:extLst>
   </p:cSld>
@@ -1049,7 +1054,7 @@
             <a:fld id="{7869E4BF-B381-8644-AA46-686D076790DE}" type="datetimeFigureOut">
               <a:rPr lang="en-US" smtClean="0"/>
               <a:pPr/>
-              <a:t>12/1/2015</a:t>
+              <a:t>12/5/2015</a:t>
             </a:fld>
             <a:endParaRPr lang="en-US"/>
           </a:p>
@@ -1101,7 +1106,7 @@
     </p:spTree>
     <p:extLst>
       <p:ext uri="{BB962C8B-B14F-4D97-AF65-F5344CB8AC3E}">
-        <p14:creationId xmlns:p14="http://schemas.microsoft.com/office/powerpoint/2010/main" val="1402456174"/>
+        <p14:creationId xmlns:p14="http://schemas.microsoft.com/office/powerpoint/2010/main" val="159285949"/>
       </p:ext>
     </p:extLst>
   </p:cSld>
@@ -1221,7 +1226,7 @@
             <a:fld id="{7869E4BF-B381-8644-AA46-686D076790DE}" type="datetimeFigureOut">
               <a:rPr lang="en-US" smtClean="0"/>
               <a:pPr/>
-              <a:t>12/1/2015</a:t>
+              <a:t>12/5/2015</a:t>
             </a:fld>
             <a:endParaRPr lang="en-US"/>
           </a:p>
@@ -1273,7 +1278,7 @@
     </p:spTree>
     <p:extLst>
       <p:ext uri="{BB962C8B-B14F-4D97-AF65-F5344CB8AC3E}">
-        <p14:creationId xmlns:p14="http://schemas.microsoft.com/office/powerpoint/2010/main" val="44898023"/>
+        <p14:creationId xmlns:p14="http://schemas.microsoft.com/office/powerpoint/2010/main" val="3511490986"/>
       </p:ext>
     </p:extLst>
   </p:cSld>
@@ -1467,7 +1472,7 @@
             <a:fld id="{7869E4BF-B381-8644-AA46-686D076790DE}" type="datetimeFigureOut">
               <a:rPr lang="en-US" smtClean="0"/>
               <a:pPr/>
-              <a:t>12/1/2015</a:t>
+              <a:t>12/5/2015</a:t>
             </a:fld>
             <a:endParaRPr lang="en-US"/>
           </a:p>
@@ -1519,7 +1524,7 @@
     </p:spTree>
     <p:extLst>
       <p:ext uri="{BB962C8B-B14F-4D97-AF65-F5344CB8AC3E}">
-        <p14:creationId xmlns:p14="http://schemas.microsoft.com/office/powerpoint/2010/main" val="834312464"/>
+        <p14:creationId xmlns:p14="http://schemas.microsoft.com/office/powerpoint/2010/main" val="2360279161"/>
       </p:ext>
     </p:extLst>
   </p:cSld>
@@ -1701,7 +1706,7 @@
             <a:fld id="{7869E4BF-B381-8644-AA46-686D076790DE}" type="datetimeFigureOut">
               <a:rPr lang="en-US" smtClean="0"/>
               <a:pPr/>
-              <a:t>12/1/2015</a:t>
+              <a:t>12/5/2015</a:t>
             </a:fld>
             <a:endParaRPr lang="en-US"/>
           </a:p>
@@ -1753,7 +1758,7 @@
     </p:spTree>
     <p:extLst>
       <p:ext uri="{BB962C8B-B14F-4D97-AF65-F5344CB8AC3E}">
-        <p14:creationId xmlns:p14="http://schemas.microsoft.com/office/powerpoint/2010/main" val="1368851185"/>
+        <p14:creationId xmlns:p14="http://schemas.microsoft.com/office/powerpoint/2010/main" val="3102140611"/>
       </p:ext>
     </p:extLst>
   </p:cSld>
@@ -2070,7 +2075,7 @@
             <a:fld id="{7869E4BF-B381-8644-AA46-686D076790DE}" type="datetimeFigureOut">
               <a:rPr lang="en-US" smtClean="0"/>
               <a:pPr/>
-              <a:t>12/1/2015</a:t>
+              <a:t>12/5/2015</a:t>
             </a:fld>
             <a:endParaRPr lang="en-US"/>
           </a:p>
@@ -2122,7 +2127,7 @@
     </p:spTree>
     <p:extLst>
       <p:ext uri="{BB962C8B-B14F-4D97-AF65-F5344CB8AC3E}">
-        <p14:creationId xmlns:p14="http://schemas.microsoft.com/office/powerpoint/2010/main" val="289555984"/>
+        <p14:creationId xmlns:p14="http://schemas.microsoft.com/office/powerpoint/2010/main" val="3217893968"/>
       </p:ext>
     </p:extLst>
   </p:cSld>
@@ -2190,7 +2195,7 @@
             <a:fld id="{7869E4BF-B381-8644-AA46-686D076790DE}" type="datetimeFigureOut">
               <a:rPr lang="en-US" smtClean="0"/>
               <a:pPr/>
-              <a:t>12/1/2015</a:t>
+              <a:t>12/5/2015</a:t>
             </a:fld>
             <a:endParaRPr lang="en-US"/>
           </a:p>
@@ -2242,7 +2247,7 @@
     </p:spTree>
     <p:extLst>
       <p:ext uri="{BB962C8B-B14F-4D97-AF65-F5344CB8AC3E}">
-        <p14:creationId xmlns:p14="http://schemas.microsoft.com/office/powerpoint/2010/main" val="369478986"/>
+        <p14:creationId xmlns:p14="http://schemas.microsoft.com/office/powerpoint/2010/main" val="88085851"/>
       </p:ext>
     </p:extLst>
   </p:cSld>
@@ -2287,7 +2292,7 @@
             <a:fld id="{7869E4BF-B381-8644-AA46-686D076790DE}" type="datetimeFigureOut">
               <a:rPr lang="en-US" smtClean="0"/>
               <a:pPr/>
-              <a:t>12/1/2015</a:t>
+              <a:t>12/5/2015</a:t>
             </a:fld>
             <a:endParaRPr lang="en-US"/>
           </a:p>
@@ -2339,7 +2344,7 @@
     </p:spTree>
     <p:extLst>
       <p:ext uri="{BB962C8B-B14F-4D97-AF65-F5344CB8AC3E}">
-        <p14:creationId xmlns:p14="http://schemas.microsoft.com/office/powerpoint/2010/main" val="1458094225"/>
+        <p14:creationId xmlns:p14="http://schemas.microsoft.com/office/powerpoint/2010/main" val="2348172265"/>
       </p:ext>
     </p:extLst>
   </p:cSld>
@@ -2566,7 +2571,7 @@
             <a:fld id="{7869E4BF-B381-8644-AA46-686D076790DE}" type="datetimeFigureOut">
               <a:rPr lang="en-US" smtClean="0"/>
               <a:pPr/>
-              <a:t>12/1/2015</a:t>
+              <a:t>12/5/2015</a:t>
             </a:fld>
             <a:endParaRPr lang="en-US"/>
           </a:p>
@@ -2618,7 +2623,7 @@
     </p:spTree>
     <p:extLst>
       <p:ext uri="{BB962C8B-B14F-4D97-AF65-F5344CB8AC3E}">
-        <p14:creationId xmlns:p14="http://schemas.microsoft.com/office/powerpoint/2010/main" val="1253743658"/>
+        <p14:creationId xmlns:p14="http://schemas.microsoft.com/office/powerpoint/2010/main" val="139046319"/>
       </p:ext>
     </p:extLst>
   </p:cSld>
@@ -2736,7 +2741,7 @@
           <a:p>
             <a:r>
               <a:rPr lang="en-US" smtClean="0"/>
-              <a:t>Drag picture to placeholder or click icon to add</a:t>
+              <a:t>Click icon to add picture</a:t>
             </a:r>
             <a:endParaRPr lang="en-US" dirty="0"/>
           </a:p>
@@ -2825,7 +2830,7 @@
             <a:fld id="{7869E4BF-B381-8644-AA46-686D076790DE}" type="datetimeFigureOut">
               <a:rPr lang="en-US" smtClean="0"/>
               <a:pPr/>
-              <a:t>12/1/2015</a:t>
+              <a:t>12/5/2015</a:t>
             </a:fld>
             <a:endParaRPr lang="en-US"/>
           </a:p>
@@ -2877,7 +2882,7 @@
     </p:spTree>
     <p:extLst>
       <p:ext uri="{BB962C8B-B14F-4D97-AF65-F5344CB8AC3E}">
-        <p14:creationId xmlns:p14="http://schemas.microsoft.com/office/powerpoint/2010/main" val="560115642"/>
+        <p14:creationId xmlns:p14="http://schemas.microsoft.com/office/powerpoint/2010/main" val="89899370"/>
       </p:ext>
     </p:extLst>
   </p:cSld>
@@ -3040,7 +3045,7 @@
             <a:fld id="{7869E4BF-B381-8644-AA46-686D076790DE}" type="datetimeFigureOut">
               <a:rPr lang="en-US" smtClean="0"/>
               <a:pPr/>
-              <a:t>12/1/2015</a:t>
+              <a:t>12/5/2015</a:t>
             </a:fld>
             <a:endParaRPr lang="en-US"/>
           </a:p>
@@ -3128,23 +3133,23 @@
     </p:spTree>
     <p:extLst>
       <p:ext uri="{BB962C8B-B14F-4D97-AF65-F5344CB8AC3E}">
-        <p14:creationId xmlns:p14="http://schemas.microsoft.com/office/powerpoint/2010/main" val="164545963"/>
+        <p14:creationId xmlns:p14="http://schemas.microsoft.com/office/powerpoint/2010/main" val="2732701855"/>
       </p:ext>
     </p:extLst>
   </p:cSld>
   <p:clrMap bg1="lt1" tx1="dk1" bg2="lt2" tx2="dk2" accent1="accent1" accent2="accent2" accent3="accent3" accent4="accent4" accent5="accent5" accent6="accent6" hlink="hlink" folHlink="folHlink"/>
   <p:sldLayoutIdLst>
-    <p:sldLayoutId id="2147483673" r:id="rId1"/>
-    <p:sldLayoutId id="2147483674" r:id="rId2"/>
-    <p:sldLayoutId id="2147483675" r:id="rId3"/>
-    <p:sldLayoutId id="2147483676" r:id="rId4"/>
-    <p:sldLayoutId id="2147483677" r:id="rId5"/>
-    <p:sldLayoutId id="2147483678" r:id="rId6"/>
-    <p:sldLayoutId id="2147483679" r:id="rId7"/>
-    <p:sldLayoutId id="2147483680" r:id="rId8"/>
-    <p:sldLayoutId id="2147483681" r:id="rId9"/>
-    <p:sldLayoutId id="2147483682" r:id="rId10"/>
-    <p:sldLayoutId id="2147483683" r:id="rId11"/>
+    <p:sldLayoutId id="2147483709" r:id="rId1"/>
+    <p:sldLayoutId id="2147483710" r:id="rId2"/>
+    <p:sldLayoutId id="2147483711" r:id="rId3"/>
+    <p:sldLayoutId id="2147483712" r:id="rId4"/>
+    <p:sldLayoutId id="2147483713" r:id="rId5"/>
+    <p:sldLayoutId id="2147483714" r:id="rId6"/>
+    <p:sldLayoutId id="2147483715" r:id="rId7"/>
+    <p:sldLayoutId id="2147483716" r:id="rId8"/>
+    <p:sldLayoutId id="2147483717" r:id="rId9"/>
+    <p:sldLayoutId id="2147483718" r:id="rId10"/>
+    <p:sldLayoutId id="2147483719" r:id="rId11"/>
   </p:sldLayoutIdLst>
   <p:txStyles>
     <p:titleStyle>
@@ -3446,111 +3451,9 @@
           <a:chExt cx="0" cy="0"/>
         </a:xfrm>
       </p:grpSpPr>
-      <p:sp>
-        <p:nvSpPr>
-          <p:cNvPr id="4" name="TextBox 3"/>
-          <p:cNvSpPr txBox="1"/>
-          <p:nvPr/>
-        </p:nvSpPr>
-        <p:spPr>
-          <a:xfrm flipH="1">
-            <a:off x="2791326" y="514350"/>
-            <a:ext cx="37105390" cy="4524315"/>
-          </a:xfrm>
-          <a:prstGeom prst="rect">
-            <a:avLst/>
-          </a:prstGeom>
-          <a:noFill/>
-        </p:spPr>
-        <p:txBody>
-          <a:bodyPr wrap="square" rtlCol="0">
-            <a:spAutoFit/>
-          </a:bodyPr>
-          <a:lstStyle/>
-          <a:p>
-            <a:pPr algn="ctr"/>
-            <a:r>
-              <a:rPr lang="en-US" sz="14400" dirty="0" smtClean="0"/>
-              <a:t>Multipath TCP: A Comparative Analysis for Linux kernel implementation</a:t>
-            </a:r>
-            <a:endParaRPr lang="en-US" sz="14400" dirty="0"/>
-          </a:p>
-        </p:txBody>
-      </p:sp>
-      <p:sp>
-        <p:nvSpPr>
-          <p:cNvPr id="5" name="TextBox 4"/>
-          <p:cNvSpPr txBox="1"/>
-          <p:nvPr/>
-        </p:nvSpPr>
-        <p:spPr>
-          <a:xfrm flipH="1">
-            <a:off x="8771021" y="5519928"/>
-            <a:ext cx="25146000" cy="1015663"/>
-          </a:xfrm>
-          <a:prstGeom prst="rect">
-            <a:avLst/>
-          </a:prstGeom>
-          <a:noFill/>
-        </p:spPr>
-        <p:txBody>
-          <a:bodyPr wrap="square" rtlCol="0">
-            <a:spAutoFit/>
-          </a:bodyPr>
-          <a:lstStyle/>
-          <a:p>
-            <a:pPr algn="ctr"/>
-            <a:r>
-              <a:rPr lang="en-US" sz="6000" dirty="0" err="1" smtClean="0"/>
-              <a:t>Agneev</a:t>
-            </a:r>
-            <a:r>
-              <a:rPr lang="en-US" sz="6000" dirty="0" smtClean="0"/>
-              <a:t> Ghosh, </a:t>
-            </a:r>
-            <a:r>
-              <a:rPr lang="en-US" sz="6000" dirty="0" err="1" smtClean="0"/>
-              <a:t>Jayant</a:t>
-            </a:r>
-            <a:r>
-              <a:rPr lang="en-US" sz="6000" dirty="0" smtClean="0"/>
-              <a:t> </a:t>
-            </a:r>
-            <a:r>
-              <a:rPr lang="en-US" sz="6000" dirty="0" err="1" smtClean="0"/>
-              <a:t>Malani</a:t>
-            </a:r>
-            <a:r>
-              <a:rPr lang="en-US" sz="6000" dirty="0" smtClean="0"/>
-              <a:t> and </a:t>
-            </a:r>
-            <a:r>
-              <a:rPr lang="en-US" sz="6000" dirty="0" err="1" smtClean="0"/>
-              <a:t>Heli</a:t>
-            </a:r>
-            <a:r>
-              <a:rPr lang="en-US" sz="6000" dirty="0" smtClean="0"/>
-              <a:t> </a:t>
-            </a:r>
-            <a:r>
-              <a:rPr lang="en-US" sz="6000" dirty="0" err="1" smtClean="0"/>
-              <a:t>Utpal</a:t>
-            </a:r>
-            <a:r>
-              <a:rPr lang="en-US" sz="6000" dirty="0" smtClean="0"/>
-              <a:t> </a:t>
-            </a:r>
-            <a:r>
-              <a:rPr lang="en-US" sz="6000" dirty="0" err="1" smtClean="0"/>
-              <a:t>Modi</a:t>
-            </a:r>
-            <a:endParaRPr lang="en-US" sz="6000" dirty="0"/>
-          </a:p>
-        </p:txBody>
-      </p:sp>
       <p:pic>
         <p:nvPicPr>
-          <p:cNvPr id="6" name="Picture 5"/>
+          <p:cNvPr id="3" name="Picture 2"/>
           <p:cNvPicPr>
             <a:picLocks noChangeAspect="1"/>
           </p:cNvPicPr>
@@ -3570,123 +3473,17 @@
         </p:blipFill>
         <p:spPr>
           <a:xfrm>
-            <a:off x="848226" y="3546415"/>
-            <a:ext cx="3886200" cy="2984500"/>
+            <a:off x="32042836" y="7371292"/>
+            <a:ext cx="7026128" cy="5090326"/>
           </a:xfrm>
           <a:prstGeom prst="rect">
             <a:avLst/>
           </a:prstGeom>
         </p:spPr>
       </p:pic>
-      <p:sp>
-        <p:nvSpPr>
-          <p:cNvPr id="7" name="TextBox 6"/>
-          <p:cNvSpPr txBox="1"/>
-          <p:nvPr/>
-        </p:nvSpPr>
-        <p:spPr>
-          <a:xfrm flipH="1">
-            <a:off x="848224" y="8008447"/>
-            <a:ext cx="13541543" cy="1107996"/>
-          </a:xfrm>
-          <a:prstGeom prst="rect">
-            <a:avLst/>
-          </a:prstGeom>
-          <a:solidFill>
-            <a:schemeClr val="accent6">
-              <a:lumMod val="60000"/>
-              <a:lumOff val="40000"/>
-            </a:schemeClr>
-          </a:solidFill>
-        </p:spPr>
-        <p:txBody>
-          <a:bodyPr wrap="square" rtlCol="0">
-            <a:spAutoFit/>
-          </a:bodyPr>
-          <a:lstStyle/>
-          <a:p>
-            <a:pPr algn="ctr"/>
-            <a:r>
-              <a:rPr lang="en-US" sz="6600" b="1" dirty="0" smtClean="0"/>
-              <a:t>Motivation: Justify MPTCP’s usability  </a:t>
-            </a:r>
-            <a:endParaRPr lang="en-US" sz="6600" b="1" dirty="0"/>
-          </a:p>
-        </p:txBody>
-      </p:sp>
-      <p:sp>
-        <p:nvSpPr>
-          <p:cNvPr id="8" name="TextBox 7"/>
-          <p:cNvSpPr txBox="1"/>
-          <p:nvPr/>
-        </p:nvSpPr>
-        <p:spPr>
-          <a:xfrm flipH="1">
-            <a:off x="848225" y="9914020"/>
-            <a:ext cx="13541541" cy="3170099"/>
-          </a:xfrm>
-          <a:prstGeom prst="rect">
-            <a:avLst/>
-          </a:prstGeom>
-          <a:noFill/>
-        </p:spPr>
-        <p:txBody>
-          <a:bodyPr wrap="square" rtlCol="0">
-            <a:spAutoFit/>
-          </a:bodyPr>
-          <a:lstStyle/>
-          <a:p>
-            <a:r>
-              <a:rPr lang="en-US" sz="5000" b="1" dirty="0" smtClean="0"/>
-              <a:t>Aim: </a:t>
-            </a:r>
-            <a:r>
-              <a:rPr lang="en-US" sz="5000" dirty="0" smtClean="0"/>
-              <a:t>Using existing MPTCP principles for Linux kernel implementation, develop a framework incorporating a comparative study of MPTCP protocol w.r.t. TCP and UDP protocols. </a:t>
-            </a:r>
-            <a:endParaRPr lang="en-US" sz="5000" dirty="0"/>
-          </a:p>
-        </p:txBody>
-      </p:sp>
-      <p:sp>
-        <p:nvSpPr>
-          <p:cNvPr id="9" name="TextBox 8"/>
-          <p:cNvSpPr txBox="1"/>
-          <p:nvPr/>
-        </p:nvSpPr>
-        <p:spPr>
-          <a:xfrm flipH="1">
-            <a:off x="848223" y="13881696"/>
-            <a:ext cx="13541543" cy="1107996"/>
-          </a:xfrm>
-          <a:prstGeom prst="rect">
-            <a:avLst/>
-          </a:prstGeom>
-          <a:solidFill>
-            <a:schemeClr val="accent6">
-              <a:lumMod val="60000"/>
-              <a:lumOff val="40000"/>
-            </a:schemeClr>
-          </a:solidFill>
-        </p:spPr>
-        <p:txBody>
-          <a:bodyPr wrap="square" rtlCol="0">
-            <a:spAutoFit/>
-          </a:bodyPr>
-          <a:lstStyle/>
-          <a:p>
-            <a:pPr algn="ctr"/>
-            <a:r>
-              <a:rPr lang="en-US" sz="6600" b="1" dirty="0" smtClean="0"/>
-              <a:t>Crux of the project: Key Results  </a:t>
-            </a:r>
-            <a:endParaRPr lang="en-US" sz="6600" b="1" dirty="0"/>
-          </a:p>
-        </p:txBody>
-      </p:sp>
       <p:pic>
         <p:nvPicPr>
-          <p:cNvPr id="11" name="Picture 10"/>
+          <p:cNvPr id="59" name="Picture 58"/>
           <p:cNvPicPr>
             <a:picLocks noChangeAspect="1"/>
           </p:cNvPicPr>
@@ -3706,408 +3503,17 @@
         </p:blipFill>
         <p:spPr>
           <a:xfrm>
-            <a:off x="848222" y="14877685"/>
-            <a:ext cx="13541544" cy="7426008"/>
+            <a:off x="23937794" y="7466523"/>
+            <a:ext cx="6348332" cy="4761249"/>
           </a:xfrm>
           <a:prstGeom prst="rect">
             <a:avLst/>
           </a:prstGeom>
         </p:spPr>
       </p:pic>
-      <p:sp>
-        <p:nvSpPr>
-          <p:cNvPr id="12" name="TextBox 11"/>
-          <p:cNvSpPr txBox="1"/>
-          <p:nvPr/>
-        </p:nvSpPr>
-        <p:spPr>
-          <a:xfrm flipH="1">
-            <a:off x="848221" y="22340473"/>
-            <a:ext cx="13541541" cy="10095071"/>
-          </a:xfrm>
-          <a:prstGeom prst="rect">
-            <a:avLst/>
-          </a:prstGeom>
-          <a:noFill/>
-        </p:spPr>
-        <p:txBody>
-          <a:bodyPr wrap="square" rtlCol="0">
-            <a:spAutoFit/>
-          </a:bodyPr>
-          <a:lstStyle/>
-          <a:p>
-            <a:pPr marL="685800" indent="-685800">
-              <a:buFont typeface="Arial" charset="0"/>
-              <a:buChar char="•"/>
-            </a:pPr>
-            <a:r>
-              <a:rPr lang="en-US" sz="5000" dirty="0" smtClean="0"/>
-              <a:t>The number of sub-flows(*N), as experimentally found to be optimal, is 10; if sub-flows &gt; *N, secondary path (</a:t>
-            </a:r>
-            <a:r>
-              <a:rPr lang="en-US" sz="5000" dirty="0" err="1" smtClean="0"/>
-              <a:t>Wifi</a:t>
-            </a:r>
-            <a:r>
-              <a:rPr lang="en-US" sz="5000" dirty="0" smtClean="0"/>
-              <a:t>) is not utilized.  </a:t>
-            </a:r>
-          </a:p>
-          <a:p>
-            <a:pPr marL="685800" indent="-685800">
-              <a:buFont typeface="Arial" charset="0"/>
-              <a:buChar char="•"/>
-            </a:pPr>
-            <a:r>
-              <a:rPr lang="en-US" sz="5000" dirty="0" smtClean="0"/>
-              <a:t>Hence, MPTCP Protocol performs better than TCP and UDP when the above condition(*N) holds.</a:t>
-            </a:r>
-          </a:p>
-          <a:p>
-            <a:pPr marL="685800" indent="-685800">
-              <a:buFont typeface="Arial" charset="0"/>
-              <a:buChar char="•"/>
-            </a:pPr>
-            <a:r>
-              <a:rPr lang="en-US" sz="5000" dirty="0" smtClean="0"/>
-              <a:t>For *N sub-flows MPTCP works better than *N number of logical TCP connections.</a:t>
-            </a:r>
-          </a:p>
-          <a:p>
-            <a:pPr marL="685800" indent="-685800">
-              <a:buFont typeface="Arial" charset="0"/>
-              <a:buChar char="•"/>
-            </a:pPr>
-            <a:r>
-              <a:rPr lang="en-US" sz="5000" dirty="0"/>
-              <a:t>I</a:t>
-            </a:r>
-            <a:r>
-              <a:rPr lang="en-US" sz="5000" dirty="0" smtClean="0"/>
-              <a:t>ntroduced delay on Ethernet path, in the MPTCP (sub-flows &gt; *N); however secondary path still unutilized.</a:t>
-            </a:r>
-          </a:p>
-          <a:p>
-            <a:pPr marL="685800" indent="-685800">
-              <a:buFont typeface="Arial" charset="0"/>
-              <a:buChar char="•"/>
-            </a:pPr>
-            <a:r>
-              <a:rPr lang="en-US" sz="5000" dirty="0" smtClean="0"/>
-              <a:t>Analyzed the throughput and delay as perceived for various congestion control algorithms. </a:t>
-            </a:r>
-          </a:p>
-        </p:txBody>
-      </p:sp>
-      <p:sp>
-        <p:nvSpPr>
-          <p:cNvPr id="13" name="TextBox 12"/>
-          <p:cNvSpPr txBox="1"/>
-          <p:nvPr/>
-        </p:nvSpPr>
-        <p:spPr>
-          <a:xfrm flipH="1">
-            <a:off x="15582897" y="8008447"/>
-            <a:ext cx="13541543" cy="1107996"/>
-          </a:xfrm>
-          <a:prstGeom prst="rect">
-            <a:avLst/>
-          </a:prstGeom>
-          <a:solidFill>
-            <a:schemeClr val="accent6">
-              <a:lumMod val="60000"/>
-              <a:lumOff val="40000"/>
-            </a:schemeClr>
-          </a:solidFill>
-        </p:spPr>
-        <p:txBody>
-          <a:bodyPr wrap="square" rtlCol="0">
-            <a:spAutoFit/>
-          </a:bodyPr>
-          <a:lstStyle/>
-          <a:p>
-            <a:pPr algn="ctr"/>
-            <a:r>
-              <a:rPr lang="en-US" sz="6600" b="1" dirty="0" smtClean="0"/>
-              <a:t>Real Time Simulation &amp; Evaluations  </a:t>
-            </a:r>
-            <a:endParaRPr lang="en-US" sz="6600" b="1" dirty="0"/>
-          </a:p>
-        </p:txBody>
-      </p:sp>
-      <p:sp>
-        <p:nvSpPr>
-          <p:cNvPr id="15" name="TextBox 14"/>
-          <p:cNvSpPr txBox="1"/>
-          <p:nvPr/>
-        </p:nvSpPr>
-        <p:spPr>
-          <a:xfrm flipH="1">
-            <a:off x="15582895" y="15610156"/>
-            <a:ext cx="13541541" cy="1631216"/>
-          </a:xfrm>
-          <a:prstGeom prst="rect">
-            <a:avLst/>
-          </a:prstGeom>
-          <a:noFill/>
-        </p:spPr>
-        <p:txBody>
-          <a:bodyPr wrap="square" rtlCol="0">
-            <a:spAutoFit/>
-          </a:bodyPr>
-          <a:lstStyle/>
-          <a:p>
-            <a:pPr algn="ctr"/>
-            <a:r>
-              <a:rPr lang="en-US" sz="5000" b="1" dirty="0" smtClean="0"/>
-              <a:t>Graph-1: </a:t>
-            </a:r>
-            <a:r>
-              <a:rPr lang="en-US" sz="5000" dirty="0" smtClean="0"/>
-              <a:t>MPTCP</a:t>
-            </a:r>
-            <a:r>
-              <a:rPr lang="en-US" sz="5000" b="1" dirty="0" smtClean="0"/>
-              <a:t> </a:t>
-            </a:r>
-            <a:r>
-              <a:rPr lang="en-US" sz="5000" dirty="0" smtClean="0"/>
-              <a:t>Mean Throughput v/s No. of sub-flows</a:t>
-            </a:r>
-            <a:endParaRPr lang="en-US" sz="5000" b="1" dirty="0"/>
-          </a:p>
-        </p:txBody>
-      </p:sp>
-      <p:sp>
-        <p:nvSpPr>
-          <p:cNvPr id="16" name="TextBox 15"/>
-          <p:cNvSpPr txBox="1"/>
-          <p:nvPr/>
-        </p:nvSpPr>
-        <p:spPr>
-          <a:xfrm flipH="1">
-            <a:off x="15582894" y="23361400"/>
-            <a:ext cx="13541541" cy="1631216"/>
-          </a:xfrm>
-          <a:prstGeom prst="rect">
-            <a:avLst/>
-          </a:prstGeom>
-          <a:noFill/>
-        </p:spPr>
-        <p:txBody>
-          <a:bodyPr wrap="square" rtlCol="0">
-            <a:spAutoFit/>
-          </a:bodyPr>
-          <a:lstStyle/>
-          <a:p>
-            <a:pPr algn="ctr"/>
-            <a:r>
-              <a:rPr lang="en-US" sz="5000" b="1" dirty="0" smtClean="0"/>
-              <a:t>Graph-2: </a:t>
-            </a:r>
-            <a:r>
-              <a:rPr lang="en-US" sz="5000" dirty="0" smtClean="0"/>
-              <a:t>Mean Throughput </a:t>
-            </a:r>
-            <a:r>
-              <a:rPr lang="en-US" sz="5000" smtClean="0"/>
-              <a:t>v/s Time for MPTCP and TCP </a:t>
-            </a:r>
-            <a:endParaRPr lang="en-US" sz="5000" b="1" dirty="0"/>
-          </a:p>
-        </p:txBody>
-      </p:sp>
-      <p:sp>
-        <p:nvSpPr>
-          <p:cNvPr id="17" name="TextBox 16"/>
-          <p:cNvSpPr txBox="1"/>
-          <p:nvPr/>
-        </p:nvSpPr>
-        <p:spPr>
-          <a:xfrm flipH="1">
-            <a:off x="15582893" y="30804328"/>
-            <a:ext cx="13541541" cy="1631216"/>
-          </a:xfrm>
-          <a:prstGeom prst="rect">
-            <a:avLst/>
-          </a:prstGeom>
-          <a:noFill/>
-        </p:spPr>
-        <p:txBody>
-          <a:bodyPr wrap="square" rtlCol="0">
-            <a:spAutoFit/>
-          </a:bodyPr>
-          <a:lstStyle/>
-          <a:p>
-            <a:pPr algn="ctr"/>
-            <a:r>
-              <a:rPr lang="en-US" sz="5000" b="1" dirty="0" smtClean="0"/>
-              <a:t>Graph-3: </a:t>
-            </a:r>
-            <a:r>
-              <a:rPr lang="en-US" sz="5000" dirty="0" smtClean="0"/>
-              <a:t>*N sub-flows MPTCP v/s *N number of logical TCP connections</a:t>
-            </a:r>
-            <a:endParaRPr lang="en-US" sz="5000" b="1" dirty="0"/>
-          </a:p>
-        </p:txBody>
-      </p:sp>
-      <p:sp>
-        <p:nvSpPr>
-          <p:cNvPr id="18" name="TextBox 17"/>
-          <p:cNvSpPr txBox="1"/>
-          <p:nvPr/>
-        </p:nvSpPr>
-        <p:spPr>
-          <a:xfrm flipH="1">
-            <a:off x="29653824" y="15610156"/>
-            <a:ext cx="13541541" cy="1631216"/>
-          </a:xfrm>
-          <a:prstGeom prst="rect">
-            <a:avLst/>
-          </a:prstGeom>
-          <a:noFill/>
-        </p:spPr>
-        <p:txBody>
-          <a:bodyPr wrap="square" rtlCol="0">
-            <a:spAutoFit/>
-          </a:bodyPr>
-          <a:lstStyle/>
-          <a:p>
-            <a:pPr algn="ctr"/>
-            <a:r>
-              <a:rPr lang="en-US" sz="5000" b="1" dirty="0" smtClean="0"/>
-              <a:t>Graph-4:  </a:t>
-            </a:r>
-            <a:r>
-              <a:rPr lang="en-US" sz="5000" dirty="0" smtClean="0"/>
-              <a:t>Comparative Analysis of Congestion Control protocols</a:t>
-            </a:r>
-            <a:endParaRPr lang="en-US" sz="5000" dirty="0"/>
-          </a:p>
-        </p:txBody>
-      </p:sp>
-      <p:sp>
-        <p:nvSpPr>
-          <p:cNvPr id="19" name="TextBox 18"/>
-          <p:cNvSpPr txBox="1"/>
-          <p:nvPr/>
-        </p:nvSpPr>
-        <p:spPr>
-          <a:xfrm flipH="1">
-            <a:off x="29653824" y="17795370"/>
-            <a:ext cx="13541543" cy="1107996"/>
-          </a:xfrm>
-          <a:prstGeom prst="rect">
-            <a:avLst/>
-          </a:prstGeom>
-          <a:solidFill>
-            <a:schemeClr val="accent6">
-              <a:lumMod val="60000"/>
-              <a:lumOff val="40000"/>
-            </a:schemeClr>
-          </a:solidFill>
-        </p:spPr>
-        <p:txBody>
-          <a:bodyPr wrap="square" rtlCol="0">
-            <a:spAutoFit/>
-          </a:bodyPr>
-          <a:lstStyle/>
-          <a:p>
-            <a:pPr algn="ctr"/>
-            <a:r>
-              <a:rPr lang="en-US" sz="6600" b="1" dirty="0" smtClean="0"/>
-              <a:t>Conclusive Remarks with Future Work  </a:t>
-            </a:r>
-            <a:endParaRPr lang="en-US" sz="6600" b="1" dirty="0"/>
-          </a:p>
-        </p:txBody>
-      </p:sp>
-      <p:sp>
-        <p:nvSpPr>
-          <p:cNvPr id="20" name="TextBox 19"/>
-          <p:cNvSpPr txBox="1"/>
-          <p:nvPr/>
-        </p:nvSpPr>
-        <p:spPr>
-          <a:xfrm flipH="1">
-            <a:off x="29653826" y="18903366"/>
-            <a:ext cx="13541541" cy="13942278"/>
-          </a:xfrm>
-          <a:prstGeom prst="rect">
-            <a:avLst/>
-          </a:prstGeom>
-          <a:noFill/>
-        </p:spPr>
-        <p:txBody>
-          <a:bodyPr wrap="square" rtlCol="0">
-            <a:spAutoFit/>
-          </a:bodyPr>
-          <a:lstStyle/>
-          <a:p>
-            <a:pPr algn="just">
-              <a:buFont typeface="Arial" pitchFamily="34" charset="0"/>
-              <a:buChar char="•"/>
-            </a:pPr>
-            <a:r>
-              <a:rPr lang="en-US" sz="5000" dirty="0" smtClean="0"/>
-              <a:t>Proliferation of multi-homed hosts render the concept of MPTCP as extremely imperative and riveting.</a:t>
-            </a:r>
-          </a:p>
-          <a:p>
-            <a:pPr algn="just">
-              <a:buFont typeface="Arial" pitchFamily="34" charset="0"/>
-              <a:buChar char="•"/>
-            </a:pPr>
-            <a:r>
-              <a:rPr lang="en-US" sz="5000" dirty="0" smtClean="0"/>
-              <a:t>Through our research work, we have been able to evaluate the usability and effectualness of MPTCP under vacillating conditions.</a:t>
-            </a:r>
-          </a:p>
-          <a:p>
-            <a:pPr algn="just">
-              <a:buFont typeface="Arial" pitchFamily="34" charset="0"/>
-              <a:buChar char="•"/>
-            </a:pPr>
-            <a:r>
-              <a:rPr lang="en-US" sz="5000" dirty="0" smtClean="0"/>
-              <a:t>As observed, though there are certain corner cases under which TCP and UDP outperform MPTCP, in the larger scheme of things, MPTCP does increase the reliability and performance factors of the network flow.</a:t>
-            </a:r>
-          </a:p>
-          <a:p>
-            <a:pPr algn="just">
-              <a:buFont typeface="Arial" pitchFamily="34" charset="0"/>
-              <a:buChar char="•"/>
-            </a:pPr>
-            <a:r>
-              <a:rPr lang="en-US" sz="5000" dirty="0" smtClean="0"/>
-              <a:t>Thus, MPTCP allows standard applications to reap the benefits of multipath networks.</a:t>
-            </a:r>
-          </a:p>
-          <a:p>
-            <a:pPr algn="just">
-              <a:buFont typeface="Arial" pitchFamily="34" charset="0"/>
-              <a:buChar char="•"/>
-            </a:pPr>
-            <a:r>
-              <a:rPr lang="en-US" sz="5000" dirty="0" smtClean="0"/>
-              <a:t>As future work, evaluating the scalability </a:t>
-            </a:r>
-            <a:r>
-              <a:rPr lang="en-US" sz="5000" dirty="0" err="1" smtClean="0"/>
-              <a:t>w.r.t</a:t>
-            </a:r>
-            <a:r>
-              <a:rPr lang="en-US" sz="5000" dirty="0" smtClean="0"/>
-              <a:t> deploying it over the internet , energy considerations for mobile devices, implementing better window management schemes are some the avenues of interest.   </a:t>
-            </a:r>
-            <a:endParaRPr lang="en-US" sz="5000" dirty="0"/>
-          </a:p>
-        </p:txBody>
-      </p:sp>
       <p:pic>
         <p:nvPicPr>
-          <p:cNvPr id="21" name="Content Placeholder 3"/>
+          <p:cNvPr id="6" name="Picture 5"/>
           <p:cNvPicPr>
             <a:picLocks noChangeAspect="1"/>
           </p:cNvPicPr>
@@ -4127,17 +3533,119 @@
         </p:blipFill>
         <p:spPr>
           <a:xfrm>
-            <a:off x="18959492" y="10145215"/>
-            <a:ext cx="6788341" cy="5091256"/>
+            <a:off x="1958609" y="1870742"/>
+            <a:ext cx="3681663" cy="2827421"/>
           </a:xfrm>
           <a:prstGeom prst="rect">
             <a:avLst/>
           </a:prstGeom>
         </p:spPr>
       </p:pic>
+      <p:sp>
+        <p:nvSpPr>
+          <p:cNvPr id="4" name="TextBox 3"/>
+          <p:cNvSpPr txBox="1"/>
+          <p:nvPr/>
+        </p:nvSpPr>
+        <p:spPr>
+          <a:xfrm flipH="1">
+            <a:off x="3799446" y="1353553"/>
+            <a:ext cx="35152475" cy="3591496"/>
+          </a:xfrm>
+          <a:prstGeom prst="rect">
+            <a:avLst/>
+          </a:prstGeom>
+          <a:noFill/>
+        </p:spPr>
+        <p:txBody>
+          <a:bodyPr wrap="square" rtlCol="0">
+            <a:spAutoFit/>
+          </a:bodyPr>
+          <a:lstStyle/>
+          <a:p>
+            <a:pPr algn="ctr"/>
+            <a:r>
+              <a:rPr lang="en-US" sz="11369" b="1" dirty="0"/>
+              <a:t>Multipath TCP: A Comparative Analysis for Linux kernel implementation</a:t>
+            </a:r>
+            <a:endParaRPr lang="en-US" sz="11369" b="1" dirty="0"/>
+          </a:p>
+        </p:txBody>
+      </p:sp>
+      <p:sp>
+        <p:nvSpPr>
+          <p:cNvPr id="7" name="TextBox 6"/>
+          <p:cNvSpPr txBox="1"/>
+          <p:nvPr/>
+        </p:nvSpPr>
+        <p:spPr>
+          <a:xfrm flipH="1">
+            <a:off x="1958616" y="6038236"/>
+            <a:ext cx="10005970" cy="879600"/>
+          </a:xfrm>
+          <a:prstGeom prst="rect">
+            <a:avLst/>
+          </a:prstGeom>
+          <a:solidFill>
+            <a:schemeClr val="accent6">
+              <a:lumMod val="60000"/>
+              <a:lumOff val="40000"/>
+            </a:schemeClr>
+          </a:solidFill>
+        </p:spPr>
+        <p:txBody>
+          <a:bodyPr wrap="square" rtlCol="0">
+            <a:spAutoFit/>
+          </a:bodyPr>
+          <a:lstStyle/>
+          <a:p>
+            <a:pPr algn="ctr"/>
+            <a:r>
+              <a:rPr lang="en-US" sz="5116" b="1" dirty="0"/>
+              <a:t>Goal: Analysis &amp; Justify usability      </a:t>
+            </a:r>
+            <a:endParaRPr lang="en-US" sz="5116" b="1" dirty="0"/>
+          </a:p>
+        </p:txBody>
+      </p:sp>
+      <p:sp>
+        <p:nvSpPr>
+          <p:cNvPr id="8" name="TextBox 7"/>
+          <p:cNvSpPr txBox="1"/>
+          <p:nvPr/>
+        </p:nvSpPr>
+        <p:spPr>
+          <a:xfrm flipH="1">
+            <a:off x="1958613" y="7371295"/>
+            <a:ext cx="10005969" cy="3300262"/>
+          </a:xfrm>
+          <a:prstGeom prst="rect">
+            <a:avLst/>
+          </a:prstGeom>
+          <a:noFill/>
+        </p:spPr>
+        <p:txBody>
+          <a:bodyPr wrap="square" rtlCol="0">
+            <a:spAutoFit/>
+          </a:bodyPr>
+          <a:lstStyle/>
+          <a:p>
+            <a:pPr algn="just"/>
+            <a:r>
+              <a:rPr lang="en-US" sz="4169" b="1" dirty="0"/>
+              <a:t>Aim: </a:t>
+            </a:r>
+            <a:r>
+              <a:rPr lang="en-US" sz="4169" dirty="0"/>
+              <a:t>Using existing MPTCP principles for Linux kernel implementation, develop a framework incorporating a comparative study of MPTCP protocol Design Goals and its performance w.r.t. TCP and UDP protocols. </a:t>
+            </a:r>
+            <a:endParaRPr lang="en-US" sz="4169" dirty="0"/>
+          </a:p>
+        </p:txBody>
+      </p:sp>
       <p:pic>
         <p:nvPicPr>
-          <p:cNvPr id="22" name="Content Placeholder 5"/>
+          <p:cNvPr id="11" name="Picture 10"/>
           <p:cNvPicPr>
             <a:picLocks noChangeAspect="1"/>
           </p:cNvPicPr>
@@ -4157,17 +3665,400 @@
         </p:blipFill>
         <p:spPr>
           <a:xfrm>
-            <a:off x="19168867" y="17674671"/>
-            <a:ext cx="7196333" cy="5397251"/>
+            <a:off x="2692876" y="11803389"/>
+            <a:ext cx="8399013" cy="4092179"/>
           </a:xfrm>
           <a:prstGeom prst="rect">
             <a:avLst/>
           </a:prstGeom>
         </p:spPr>
       </p:pic>
+      <p:sp>
+        <p:nvSpPr>
+          <p:cNvPr id="12" name="TextBox 11"/>
+          <p:cNvSpPr txBox="1"/>
+          <p:nvPr/>
+        </p:nvSpPr>
+        <p:spPr>
+          <a:xfrm flipH="1">
+            <a:off x="1958612" y="22662721"/>
+            <a:ext cx="10005974" cy="11640879"/>
+          </a:xfrm>
+          <a:prstGeom prst="rect">
+            <a:avLst/>
+          </a:prstGeom>
+          <a:noFill/>
+        </p:spPr>
+        <p:txBody>
+          <a:bodyPr wrap="square" rtlCol="0">
+            <a:spAutoFit/>
+          </a:bodyPr>
+          <a:lstStyle/>
+          <a:p>
+            <a:pPr marL="649727" indent="-649727">
+              <a:buFont typeface="Arial" charset="0"/>
+              <a:buChar char="•"/>
+            </a:pPr>
+            <a:r>
+              <a:rPr lang="en-US" sz="4169" i="1" dirty="0"/>
+              <a:t>Figure A  </a:t>
+            </a:r>
+            <a:r>
+              <a:rPr lang="en-US" sz="4169" dirty="0"/>
+              <a:t>depicts the primary experimental setup .</a:t>
+            </a:r>
+          </a:p>
+          <a:p>
+            <a:pPr marL="649727" indent="-649727">
+              <a:buFont typeface="Arial" charset="0"/>
+              <a:buChar char="•"/>
+            </a:pPr>
+            <a:r>
+              <a:rPr lang="en-US" sz="4169" dirty="0"/>
+              <a:t>It comprises of a MPTCP enabled client and server having multiple communication paths viz. Ethernet (</a:t>
+            </a:r>
+            <a:r>
+              <a:rPr lang="en-IN" sz="4169" dirty="0"/>
+              <a:t>5-port 12.5MBps Unmanaged Gigabit Switch)</a:t>
+            </a:r>
+            <a:r>
+              <a:rPr lang="en-US" sz="4169" dirty="0"/>
+              <a:t> and Wi-Fi (1MBps).</a:t>
+            </a:r>
+          </a:p>
+          <a:p>
+            <a:pPr marL="649727" indent="-649727">
+              <a:buFont typeface="Arial" charset="0"/>
+              <a:buChar char="•"/>
+            </a:pPr>
+            <a:r>
+              <a:rPr lang="en-US" sz="4169" i="1" dirty="0"/>
+              <a:t>Figure B </a:t>
+            </a:r>
+            <a:r>
+              <a:rPr lang="en-US" sz="4169" dirty="0"/>
+              <a:t>lays out the secondary architectural setup  which has an additional (Non MPTCP) client (connected via Ethernet) introduced to compete with the MPTCP client , to emulate pragmatic scenarios. </a:t>
+            </a:r>
+          </a:p>
+          <a:p>
+            <a:pPr marL="649727" indent="-649727">
+              <a:buFont typeface="Arial" charset="0"/>
+              <a:buChar char="•"/>
+            </a:pPr>
+            <a:endParaRPr lang="en-US" sz="4169" dirty="0"/>
+          </a:p>
+          <a:p>
+            <a:pPr marL="649727" indent="-649727">
+              <a:buFont typeface="Arial" charset="0"/>
+              <a:buChar char="•"/>
+            </a:pPr>
+            <a:endParaRPr lang="en-US" sz="4169" dirty="0"/>
+          </a:p>
+          <a:p>
+            <a:pPr marL="649727" indent="-649727">
+              <a:buFont typeface="Arial" charset="0"/>
+              <a:buChar char="•"/>
+            </a:pPr>
+            <a:endParaRPr lang="en-US" sz="4169" dirty="0"/>
+          </a:p>
+          <a:p>
+            <a:pPr marL="649727" indent="-649727">
+              <a:buFont typeface="Arial" charset="0"/>
+              <a:buChar char="•"/>
+            </a:pPr>
+            <a:endParaRPr lang="en-US" sz="4169" dirty="0"/>
+          </a:p>
+          <a:p>
+            <a:pPr marL="649727" indent="-649727"/>
+            <a:endParaRPr lang="en-US" sz="4169" dirty="0"/>
+          </a:p>
+        </p:txBody>
+      </p:sp>
+      <p:sp>
+        <p:nvSpPr>
+          <p:cNvPr id="25" name="TextBox 24"/>
+          <p:cNvSpPr txBox="1"/>
+          <p:nvPr/>
+        </p:nvSpPr>
+        <p:spPr>
+          <a:xfrm flipH="1">
+            <a:off x="9420821" y="4728096"/>
+            <a:ext cx="23822526" cy="967060"/>
+          </a:xfrm>
+          <a:prstGeom prst="rect">
+            <a:avLst/>
+          </a:prstGeom>
+          <a:noFill/>
+        </p:spPr>
+        <p:txBody>
+          <a:bodyPr wrap="square" rtlCol="0">
+            <a:spAutoFit/>
+          </a:bodyPr>
+          <a:lstStyle/>
+          <a:p>
+            <a:pPr algn="ctr"/>
+            <a:r>
+              <a:rPr lang="en-US" sz="5684" dirty="0" err="1"/>
+              <a:t>Agneev</a:t>
+            </a:r>
+            <a:r>
+              <a:rPr lang="en-US" sz="5684" dirty="0"/>
+              <a:t> Ghosh, </a:t>
+            </a:r>
+            <a:r>
+              <a:rPr lang="en-US" sz="5684" dirty="0" err="1"/>
+              <a:t>Jayant</a:t>
+            </a:r>
+            <a:r>
+              <a:rPr lang="en-US" sz="5684" dirty="0"/>
+              <a:t> </a:t>
+            </a:r>
+            <a:r>
+              <a:rPr lang="en-US" sz="5684" dirty="0" err="1"/>
+              <a:t>Malani</a:t>
+            </a:r>
+            <a:r>
+              <a:rPr lang="en-US" sz="5684" dirty="0"/>
+              <a:t> and </a:t>
+            </a:r>
+            <a:r>
+              <a:rPr lang="en-US" sz="5684" dirty="0" err="1"/>
+              <a:t>Heli</a:t>
+            </a:r>
+            <a:r>
+              <a:rPr lang="en-US" sz="5684" dirty="0"/>
+              <a:t> </a:t>
+            </a:r>
+            <a:r>
+              <a:rPr lang="en-US" sz="5684" dirty="0" err="1"/>
+              <a:t>Utpal</a:t>
+            </a:r>
+            <a:r>
+              <a:rPr lang="en-US" sz="5684" dirty="0"/>
+              <a:t> </a:t>
+            </a:r>
+            <a:r>
+              <a:rPr lang="en-US" sz="5684" dirty="0" err="1"/>
+              <a:t>Modi</a:t>
+            </a:r>
+            <a:endParaRPr lang="en-US" sz="5684" dirty="0"/>
+          </a:p>
+        </p:txBody>
+      </p:sp>
+      <p:sp>
+        <p:nvSpPr>
+          <p:cNvPr id="27" name="TextBox 26"/>
+          <p:cNvSpPr txBox="1"/>
+          <p:nvPr/>
+        </p:nvSpPr>
+        <p:spPr>
+          <a:xfrm flipH="1">
+            <a:off x="1958617" y="10963272"/>
+            <a:ext cx="10005970" cy="879600"/>
+          </a:xfrm>
+          <a:prstGeom prst="rect">
+            <a:avLst/>
+          </a:prstGeom>
+          <a:solidFill>
+            <a:schemeClr val="accent6">
+              <a:lumMod val="60000"/>
+              <a:lumOff val="40000"/>
+            </a:schemeClr>
+          </a:solidFill>
+        </p:spPr>
+        <p:txBody>
+          <a:bodyPr wrap="square" rtlCol="0">
+            <a:spAutoFit/>
+          </a:bodyPr>
+          <a:lstStyle/>
+          <a:p>
+            <a:pPr algn="ctr"/>
+            <a:r>
+              <a:rPr lang="en-US" sz="5116" b="1" dirty="0"/>
+              <a:t>Experimental Setup  </a:t>
+            </a:r>
+            <a:endParaRPr lang="en-US" sz="5116" b="1" dirty="0"/>
+          </a:p>
+        </p:txBody>
+      </p:sp>
+      <p:sp>
+        <p:nvSpPr>
+          <p:cNvPr id="35" name="TextBox 34"/>
+          <p:cNvSpPr txBox="1"/>
+          <p:nvPr/>
+        </p:nvSpPr>
+        <p:spPr>
+          <a:xfrm flipH="1">
+            <a:off x="12822182" y="6177291"/>
+            <a:ext cx="9117925" cy="879600"/>
+          </a:xfrm>
+          <a:prstGeom prst="rect">
+            <a:avLst/>
+          </a:prstGeom>
+          <a:solidFill>
+            <a:schemeClr val="accent6">
+              <a:lumMod val="60000"/>
+              <a:lumOff val="40000"/>
+            </a:schemeClr>
+          </a:solidFill>
+        </p:spPr>
+        <p:txBody>
+          <a:bodyPr wrap="square" rtlCol="0">
+            <a:spAutoFit/>
+          </a:bodyPr>
+          <a:lstStyle/>
+          <a:p>
+            <a:pPr algn="ctr"/>
+            <a:r>
+              <a:rPr lang="en-US" sz="5116" b="1" dirty="0"/>
+              <a:t>MPTCP Design Goals Validation</a:t>
+            </a:r>
+            <a:endParaRPr lang="en-US" sz="5116" b="1" dirty="0"/>
+          </a:p>
+        </p:txBody>
+      </p:sp>
+      <p:sp>
+        <p:nvSpPr>
+          <p:cNvPr id="36" name="TextBox 35"/>
+          <p:cNvSpPr txBox="1"/>
+          <p:nvPr/>
+        </p:nvSpPr>
+        <p:spPr>
+          <a:xfrm flipH="1">
+            <a:off x="12822182" y="7227305"/>
+            <a:ext cx="9488165" cy="2017091"/>
+          </a:xfrm>
+          <a:prstGeom prst="rect">
+            <a:avLst/>
+          </a:prstGeom>
+          <a:noFill/>
+        </p:spPr>
+        <p:txBody>
+          <a:bodyPr wrap="square" rtlCol="0">
+            <a:spAutoFit/>
+          </a:bodyPr>
+          <a:lstStyle/>
+          <a:p>
+            <a:r>
+              <a:rPr lang="en-US" sz="4169" b="1" dirty="0"/>
+              <a:t>#1 Fair share with TCP and</a:t>
+            </a:r>
+          </a:p>
+          <a:p>
+            <a:pPr algn="just"/>
+            <a:r>
+              <a:rPr lang="en-US" sz="4169" b="1" dirty="0"/>
+              <a:t>#2 Perform at least as well as TCP</a:t>
+            </a:r>
+          </a:p>
+          <a:p>
+            <a:pPr algn="just"/>
+            <a:endParaRPr lang="en-US" sz="4169" dirty="0"/>
+          </a:p>
+        </p:txBody>
+      </p:sp>
+      <p:sp>
+        <p:nvSpPr>
+          <p:cNvPr id="39" name="TextBox 38"/>
+          <p:cNvSpPr txBox="1"/>
+          <p:nvPr/>
+        </p:nvSpPr>
+        <p:spPr>
+          <a:xfrm flipH="1">
+            <a:off x="27850053" y="6071870"/>
+            <a:ext cx="9351385" cy="792205"/>
+          </a:xfrm>
+          <a:prstGeom prst="rect">
+            <a:avLst/>
+          </a:prstGeom>
+          <a:solidFill>
+            <a:schemeClr val="accent6">
+              <a:lumMod val="60000"/>
+              <a:lumOff val="40000"/>
+            </a:schemeClr>
+          </a:solidFill>
+        </p:spPr>
+        <p:txBody>
+          <a:bodyPr wrap="square" rtlCol="0">
+            <a:spAutoFit/>
+          </a:bodyPr>
+          <a:lstStyle/>
+          <a:p>
+            <a:pPr algn="ctr"/>
+            <a:r>
+              <a:rPr lang="en-US" sz="4548" b="1" dirty="0"/>
+              <a:t>Further Simulation &amp; Evaluations  </a:t>
+            </a:r>
+            <a:endParaRPr lang="en-US" sz="4548" b="1" dirty="0"/>
+          </a:p>
+        </p:txBody>
+      </p:sp>
+      <p:sp>
+        <p:nvSpPr>
+          <p:cNvPr id="257" name="TextBox 256"/>
+          <p:cNvSpPr txBox="1"/>
+          <p:nvPr/>
+        </p:nvSpPr>
+        <p:spPr>
+          <a:xfrm flipH="1">
+            <a:off x="32148605" y="6853900"/>
+            <a:ext cx="9351384" cy="733919"/>
+          </a:xfrm>
+          <a:prstGeom prst="rect">
+            <a:avLst/>
+          </a:prstGeom>
+          <a:noFill/>
+        </p:spPr>
+        <p:txBody>
+          <a:bodyPr wrap="square" rtlCol="0">
+            <a:spAutoFit/>
+          </a:bodyPr>
+          <a:lstStyle/>
+          <a:p>
+            <a:r>
+              <a:rPr lang="en-US" sz="4169" b="1" dirty="0"/>
+              <a:t>MPTCP Congestion Control Evaluation</a:t>
+            </a:r>
+            <a:endParaRPr lang="en-US" sz="3411" dirty="0"/>
+          </a:p>
+        </p:txBody>
+      </p:sp>
+      <p:sp>
+        <p:nvSpPr>
+          <p:cNvPr id="258" name="TextBox 257"/>
+          <p:cNvSpPr txBox="1"/>
+          <p:nvPr/>
+        </p:nvSpPr>
+        <p:spPr>
+          <a:xfrm flipH="1">
+            <a:off x="24215395" y="6803925"/>
+            <a:ext cx="9351384" cy="733919"/>
+          </a:xfrm>
+          <a:prstGeom prst="rect">
+            <a:avLst/>
+          </a:prstGeom>
+          <a:noFill/>
+        </p:spPr>
+        <p:txBody>
+          <a:bodyPr wrap="square" rtlCol="0">
+            <a:spAutoFit/>
+          </a:bodyPr>
+          <a:lstStyle/>
+          <a:p>
+            <a:r>
+              <a:rPr lang="en-US" sz="4169" b="1" dirty="0"/>
+              <a:t>Increasing Sub-Flow Analysis</a:t>
+            </a:r>
+            <a:r>
+              <a:rPr lang="en-US" sz="3411" dirty="0"/>
+              <a:t>.</a:t>
+            </a:r>
+          </a:p>
+        </p:txBody>
+      </p:sp>
       <p:pic>
         <p:nvPicPr>
-          <p:cNvPr id="23" name="Content Placeholder 7"/>
+          <p:cNvPr id="263" name="Content Placeholder 9"/>
           <p:cNvPicPr>
             <a:picLocks noChangeAspect="1"/>
           </p:cNvPicPr>
@@ -4187,24 +4078,998 @@
         </p:blipFill>
         <p:spPr>
           <a:xfrm>
-            <a:off x="33273694" y="10088893"/>
-            <a:ext cx="6623021" cy="4967266"/>
+            <a:off x="32148605" y="13979605"/>
+            <a:ext cx="9113687" cy="4776948"/>
           </a:xfrm>
           <a:prstGeom prst="rect">
             <a:avLst/>
           </a:prstGeom>
         </p:spPr>
       </p:pic>
+      <p:sp>
+        <p:nvSpPr>
+          <p:cNvPr id="266" name="TextBox 265"/>
+          <p:cNvSpPr txBox="1"/>
+          <p:nvPr/>
+        </p:nvSpPr>
+        <p:spPr>
+          <a:xfrm flipH="1">
+            <a:off x="24076988" y="12857162"/>
+            <a:ext cx="9351384" cy="733919"/>
+          </a:xfrm>
+          <a:prstGeom prst="rect">
+            <a:avLst/>
+          </a:prstGeom>
+          <a:noFill/>
+        </p:spPr>
+        <p:txBody>
+          <a:bodyPr wrap="square" rtlCol="0">
+            <a:spAutoFit/>
+          </a:bodyPr>
+          <a:lstStyle/>
+          <a:p>
+            <a:r>
+              <a:rPr lang="en-US" sz="4169" b="1" dirty="0"/>
+              <a:t>Behavior with UDP Congestion</a:t>
+            </a:r>
+          </a:p>
+        </p:txBody>
+      </p:sp>
+      <p:sp>
+        <p:nvSpPr>
+          <p:cNvPr id="272" name="TextBox 271"/>
+          <p:cNvSpPr txBox="1"/>
+          <p:nvPr/>
+        </p:nvSpPr>
+        <p:spPr>
+          <a:xfrm flipH="1">
+            <a:off x="24235812" y="19864893"/>
+            <a:ext cx="16450811" cy="879600"/>
+          </a:xfrm>
+          <a:prstGeom prst="rect">
+            <a:avLst/>
+          </a:prstGeom>
+          <a:solidFill>
+            <a:schemeClr val="accent6">
+              <a:lumMod val="60000"/>
+              <a:lumOff val="40000"/>
+            </a:schemeClr>
+          </a:solidFill>
+        </p:spPr>
+        <p:txBody>
+          <a:bodyPr wrap="square" rtlCol="0">
+            <a:spAutoFit/>
+          </a:bodyPr>
+          <a:lstStyle/>
+          <a:p>
+            <a:pPr algn="ctr"/>
+            <a:r>
+              <a:rPr lang="en-US" sz="5116" b="1" dirty="0"/>
+              <a:t>Conclusive Remarks-Key Findings and Future Work  </a:t>
+            </a:r>
+            <a:endParaRPr lang="en-US" sz="5116" b="1" dirty="0"/>
+          </a:p>
+        </p:txBody>
+      </p:sp>
+      <p:sp>
+        <p:nvSpPr>
+          <p:cNvPr id="273" name="TextBox 272"/>
+          <p:cNvSpPr txBox="1"/>
+          <p:nvPr/>
+        </p:nvSpPr>
+        <p:spPr>
+          <a:xfrm flipH="1">
+            <a:off x="23003469" y="21014889"/>
+            <a:ext cx="18893022" cy="10124054"/>
+          </a:xfrm>
+          <a:prstGeom prst="rect">
+            <a:avLst/>
+          </a:prstGeom>
+          <a:noFill/>
+        </p:spPr>
+        <p:txBody>
+          <a:bodyPr wrap="square" rtlCol="0">
+            <a:spAutoFit/>
+          </a:bodyPr>
+          <a:lstStyle/>
+          <a:p>
+            <a:pPr algn="just"/>
+            <a:r>
+              <a:rPr lang="en-IN" sz="3790" dirty="0"/>
+              <a:t>The Key Findings of the experiment are as follows:</a:t>
+            </a:r>
+          </a:p>
+          <a:p>
+            <a:pPr algn="just"/>
+            <a:r>
+              <a:rPr lang="en-IN" sz="4169" dirty="0"/>
+              <a:t>1. </a:t>
+            </a:r>
+            <a:r>
+              <a:rPr lang="en-IN" sz="3790" dirty="0"/>
+              <a:t>As collectively observed in Graphs 3 &amp; 5, </a:t>
+            </a:r>
+            <a:r>
+              <a:rPr lang="en-IN" sz="3790" dirty="0"/>
+              <a:t>we </a:t>
+            </a:r>
+            <a:r>
+              <a:rPr lang="en-IN" sz="3790" dirty="0"/>
+              <a:t>found that the optimal </a:t>
+            </a:r>
+            <a:r>
+              <a:rPr lang="en-IN" sz="3790" dirty="0"/>
+              <a:t>number of </a:t>
+            </a:r>
+            <a:r>
+              <a:rPr lang="en-IN" sz="3790" dirty="0"/>
+              <a:t>sub-flows </a:t>
+            </a:r>
+            <a:r>
+              <a:rPr lang="en-IN" sz="3790" dirty="0"/>
+              <a:t>count(*N) is 10, for which MPTCP outperforms TCP and </a:t>
+            </a:r>
+            <a:r>
+              <a:rPr lang="en-IN" sz="3790" dirty="0"/>
+              <a:t>UDP, always maintaining the property of fair share in both the cases.</a:t>
+            </a:r>
+            <a:endParaRPr lang="en-IN" sz="3790" dirty="0"/>
+          </a:p>
+          <a:p>
+            <a:pPr algn="just"/>
+            <a:r>
+              <a:rPr lang="en-IN" sz="3790" dirty="0"/>
+              <a:t>2. Graph </a:t>
+            </a:r>
+            <a:r>
+              <a:rPr lang="en-IN" sz="3790" dirty="0"/>
+              <a:t>4</a:t>
+            </a:r>
+            <a:r>
+              <a:rPr lang="en-IN" sz="3790" dirty="0"/>
+              <a:t> </a:t>
+            </a:r>
+            <a:r>
+              <a:rPr lang="en-IN" sz="3790" dirty="0"/>
+              <a:t>provides a comparative analysis among the MPTCP congestion control protocols, and it can be concluded that OLIA  performs the </a:t>
+            </a:r>
+            <a:r>
+              <a:rPr lang="en-IN" sz="3790" dirty="0"/>
+              <a:t>best by consuming least time for transmission.</a:t>
+            </a:r>
+            <a:endParaRPr lang="en-IN" sz="3790" dirty="0"/>
+          </a:p>
+          <a:p>
+            <a:pPr algn="just"/>
+            <a:r>
+              <a:rPr lang="en-IN" sz="3790" dirty="0"/>
+              <a:t>3. Graph </a:t>
+            </a:r>
+            <a:r>
+              <a:rPr lang="en-IN" sz="3790" dirty="0"/>
+              <a:t>6</a:t>
+            </a:r>
+            <a:r>
+              <a:rPr lang="en-IN" sz="3790" dirty="0"/>
+              <a:t> </a:t>
+            </a:r>
+            <a:r>
+              <a:rPr lang="en-IN" sz="3790" dirty="0"/>
+              <a:t>provides a </a:t>
+            </a:r>
+            <a:r>
+              <a:rPr lang="en-IN" sz="3790" dirty="0"/>
+              <a:t>comparative analysis of </a:t>
+            </a:r>
+            <a:r>
+              <a:rPr lang="en-IN" sz="3790" dirty="0"/>
+              <a:t>5 independent </a:t>
+            </a:r>
+            <a:r>
+              <a:rPr lang="en-IN" sz="3790" dirty="0"/>
+              <a:t>MPTCP/TCP connections (</a:t>
+            </a:r>
+            <a:r>
+              <a:rPr lang="en-IN" sz="3790" dirty="0"/>
+              <a:t>A), 5 MPTCP connections having *N number of </a:t>
+            </a:r>
+            <a:r>
+              <a:rPr lang="en-IN" sz="3790" dirty="0"/>
+              <a:t>sub-flows (</a:t>
+            </a:r>
+            <a:r>
+              <a:rPr lang="en-IN" sz="3790" dirty="0"/>
+              <a:t>B) and 1 MPTCP connection having 5 </a:t>
+            </a:r>
+            <a:r>
+              <a:rPr lang="en-IN" sz="3790" dirty="0"/>
+              <a:t>sub-flows (C</a:t>
+            </a:r>
+            <a:r>
+              <a:rPr lang="en-IN" sz="3790" dirty="0"/>
+              <a:t>). As observed, </a:t>
+            </a:r>
+            <a:r>
+              <a:rPr lang="en-IN" sz="3790" dirty="0"/>
+              <a:t>A </a:t>
+            </a:r>
+            <a:r>
+              <a:rPr lang="en-IN" sz="3790" dirty="0"/>
+              <a:t>outperforms </a:t>
+            </a:r>
+            <a:r>
+              <a:rPr lang="en-IN" sz="3790" dirty="0"/>
+              <a:t>B </a:t>
+            </a:r>
+            <a:r>
+              <a:rPr lang="en-IN" sz="3790" dirty="0"/>
+              <a:t>which outperforms </a:t>
+            </a:r>
+            <a:r>
+              <a:rPr lang="en-IN" sz="3790" dirty="0"/>
+              <a:t>C, </a:t>
+            </a:r>
+            <a:r>
+              <a:rPr lang="en-IN" sz="3790" dirty="0"/>
+              <a:t>thus justifying the need to use MPTCP </a:t>
+            </a:r>
+            <a:r>
+              <a:rPr lang="en-IN" sz="3790" dirty="0"/>
+              <a:t>connections </a:t>
+            </a:r>
+            <a:r>
+              <a:rPr lang="en-IN" sz="3790" dirty="0"/>
+              <a:t>over TCP connections. </a:t>
+            </a:r>
+            <a:r>
+              <a:rPr lang="en-IN" sz="4169" dirty="0"/>
+              <a:t> </a:t>
+            </a:r>
+            <a:r>
+              <a:rPr lang="en-IN" sz="3790" dirty="0"/>
+              <a:t> </a:t>
+            </a:r>
+            <a:endParaRPr lang="en-IN" sz="3790" dirty="0"/>
+          </a:p>
+          <a:p>
+            <a:pPr algn="just"/>
+            <a:r>
+              <a:rPr lang="en-IN" sz="3790" dirty="0"/>
+              <a:t> </a:t>
+            </a:r>
+          </a:p>
+          <a:p>
+            <a:pPr algn="just">
+              <a:buFont typeface="Arial" pitchFamily="34" charset="0"/>
+              <a:buChar char="•"/>
+            </a:pPr>
+            <a:r>
+              <a:rPr lang="en-IN" sz="3790" dirty="0"/>
+              <a:t>From </a:t>
+            </a:r>
+            <a:r>
+              <a:rPr lang="en-IN" sz="3790" dirty="0"/>
+              <a:t>the extensive </a:t>
+            </a:r>
+            <a:r>
+              <a:rPr lang="en-IN" sz="3790" dirty="0"/>
+              <a:t>analysis of various parameters such as RTT delay, packet </a:t>
+            </a:r>
+            <a:r>
+              <a:rPr lang="en-IN" sz="3790" dirty="0"/>
+              <a:t>drop </a:t>
+            </a:r>
+            <a:r>
+              <a:rPr lang="en-IN" sz="3790" dirty="0"/>
+              <a:t>rate</a:t>
+            </a:r>
+            <a:r>
+              <a:rPr lang="en-IN" sz="3790" dirty="0"/>
+              <a:t>, # </a:t>
+            </a:r>
+            <a:r>
+              <a:rPr lang="en-IN" sz="3790" dirty="0"/>
+              <a:t>of </a:t>
+            </a:r>
+            <a:r>
+              <a:rPr lang="en-IN" sz="3790" dirty="0"/>
+              <a:t>sub-flows, competing TCP and UDP connections and use of different congestion control protocols- we can conclude that MPTCP functions as good as TCP and UDP along with withholding its basic design properties i.e. full utilization of resources  </a:t>
+            </a:r>
+            <a:endParaRPr lang="en-US" sz="3790" dirty="0"/>
+          </a:p>
+          <a:p>
+            <a:pPr algn="just">
+              <a:buFont typeface="Arial" pitchFamily="34" charset="0"/>
+              <a:buChar char="•"/>
+            </a:pPr>
+            <a:r>
+              <a:rPr lang="en-US" sz="3790" dirty="0"/>
+              <a:t>For future work, evaluating the scalability w.r.t. deploying it over the internet and implementing better window management schemes are some avenues of interest.   </a:t>
+            </a:r>
+            <a:endParaRPr lang="en-US" sz="3790" dirty="0"/>
+          </a:p>
+        </p:txBody>
+      </p:sp>
+      <p:sp>
+        <p:nvSpPr>
+          <p:cNvPr id="276" name="Oval 275"/>
+          <p:cNvSpPr/>
+          <p:nvPr/>
+        </p:nvSpPr>
+        <p:spPr>
+          <a:xfrm>
+            <a:off x="26403461" y="8404434"/>
+            <a:ext cx="261636" cy="234440"/>
+          </a:xfrm>
+          <a:prstGeom prst="ellipse">
+            <a:avLst/>
+          </a:prstGeom>
+          <a:noFill/>
+          <a:ln w="9525">
+            <a:solidFill>
+              <a:schemeClr val="tx1"/>
+            </a:solidFill>
+          </a:ln>
+        </p:spPr>
+        <p:style>
+          <a:lnRef idx="2">
+            <a:schemeClr val="accent1">
+              <a:shade val="50000"/>
+            </a:schemeClr>
+          </a:lnRef>
+          <a:fillRef idx="1">
+            <a:schemeClr val="accent1"/>
+          </a:fillRef>
+          <a:effectRef idx="0">
+            <a:schemeClr val="accent1"/>
+          </a:effectRef>
+          <a:fontRef idx="minor">
+            <a:schemeClr val="lt1"/>
+          </a:fontRef>
+        </p:style>
+        <p:txBody>
+          <a:bodyPr rtlCol="0" anchor="ctr"/>
+          <a:lstStyle/>
+          <a:p>
+            <a:pPr algn="ctr"/>
+            <a:endParaRPr lang="en-US" sz="7813">
+              <a:noFill/>
+            </a:endParaRPr>
+          </a:p>
+        </p:txBody>
+      </p:sp>
+      <p:cxnSp>
+        <p:nvCxnSpPr>
+          <p:cNvPr id="280" name="Straight Arrow Connector 279"/>
+          <p:cNvCxnSpPr/>
+          <p:nvPr/>
+        </p:nvCxnSpPr>
+        <p:spPr>
+          <a:xfrm flipH="1">
+            <a:off x="26534551" y="8294488"/>
+            <a:ext cx="325599" cy="219900"/>
+          </a:xfrm>
+          <a:prstGeom prst="straightConnector1">
+            <a:avLst/>
+          </a:prstGeom>
+          <a:ln>
+            <a:solidFill>
+              <a:schemeClr val="tx1"/>
+            </a:solidFill>
+            <a:tailEnd type="triangle"/>
+          </a:ln>
+        </p:spPr>
+        <p:style>
+          <a:lnRef idx="1">
+            <a:schemeClr val="accent1"/>
+          </a:lnRef>
+          <a:fillRef idx="0">
+            <a:schemeClr val="accent1"/>
+          </a:fillRef>
+          <a:effectRef idx="0">
+            <a:schemeClr val="accent1"/>
+          </a:effectRef>
+          <a:fontRef idx="minor">
+            <a:schemeClr val="tx1"/>
+          </a:fontRef>
+        </p:style>
+      </p:cxnSp>
+      <p:sp>
+        <p:nvSpPr>
+          <p:cNvPr id="281" name="TextBox 280"/>
+          <p:cNvSpPr txBox="1"/>
+          <p:nvPr/>
+        </p:nvSpPr>
+        <p:spPr>
+          <a:xfrm>
+            <a:off x="25816623" y="8797982"/>
+            <a:ext cx="1639854" cy="267317"/>
+          </a:xfrm>
+          <a:prstGeom prst="rect">
+            <a:avLst/>
+          </a:prstGeom>
+          <a:noFill/>
+        </p:spPr>
+        <p:txBody>
+          <a:bodyPr wrap="square" rtlCol="0">
+            <a:spAutoFit/>
+          </a:bodyPr>
+          <a:lstStyle/>
+          <a:p>
+            <a:r>
+              <a:rPr lang="en-US" sz="1137" dirty="0"/>
+              <a:t>Maximum Throughput</a:t>
+            </a:r>
+            <a:endParaRPr lang="en-US" sz="1137" dirty="0"/>
+          </a:p>
+        </p:txBody>
+      </p:sp>
+      <p:sp>
+        <p:nvSpPr>
+          <p:cNvPr id="286" name="Rounded Rectangle 285"/>
+          <p:cNvSpPr/>
+          <p:nvPr/>
+        </p:nvSpPr>
+        <p:spPr>
+          <a:xfrm>
+            <a:off x="1553043" y="5690303"/>
+            <a:ext cx="10683600" cy="26001323"/>
+          </a:xfrm>
+          <a:prstGeom prst="roundRect">
+            <a:avLst>
+              <a:gd name="adj" fmla="val 6965"/>
+            </a:avLst>
+          </a:prstGeom>
+          <a:noFill/>
+        </p:spPr>
+        <p:style>
+          <a:lnRef idx="2">
+            <a:schemeClr val="accent1">
+              <a:shade val="50000"/>
+            </a:schemeClr>
+          </a:lnRef>
+          <a:fillRef idx="1">
+            <a:schemeClr val="accent1"/>
+          </a:fillRef>
+          <a:effectRef idx="0">
+            <a:schemeClr val="accent1"/>
+          </a:effectRef>
+          <a:fontRef idx="minor">
+            <a:schemeClr val="lt1"/>
+          </a:fontRef>
+        </p:style>
+        <p:txBody>
+          <a:bodyPr rtlCol="0" anchor="ctr"/>
+          <a:lstStyle/>
+          <a:p>
+            <a:pPr algn="ctr"/>
+            <a:endParaRPr lang="en-US" sz="7813"/>
+          </a:p>
+        </p:txBody>
+      </p:sp>
+      <p:sp>
+        <p:nvSpPr>
+          <p:cNvPr id="287" name="Rounded Rectangle 286"/>
+          <p:cNvSpPr/>
+          <p:nvPr/>
+        </p:nvSpPr>
+        <p:spPr>
+          <a:xfrm>
+            <a:off x="12418218" y="5690299"/>
+            <a:ext cx="10079821" cy="26001322"/>
+          </a:xfrm>
+          <a:prstGeom prst="roundRect">
+            <a:avLst>
+              <a:gd name="adj" fmla="val 6965"/>
+            </a:avLst>
+          </a:prstGeom>
+          <a:noFill/>
+        </p:spPr>
+        <p:style>
+          <a:lnRef idx="2">
+            <a:schemeClr val="accent1">
+              <a:shade val="50000"/>
+            </a:schemeClr>
+          </a:lnRef>
+          <a:fillRef idx="1">
+            <a:schemeClr val="accent1"/>
+          </a:fillRef>
+          <a:effectRef idx="0">
+            <a:schemeClr val="accent1"/>
+          </a:effectRef>
+          <a:fontRef idx="minor">
+            <a:schemeClr val="lt1"/>
+          </a:fontRef>
+        </p:style>
+        <p:txBody>
+          <a:bodyPr rtlCol="0" anchor="ctr"/>
+          <a:lstStyle/>
+          <a:p>
+            <a:pPr algn="ctr"/>
+            <a:endParaRPr lang="en-US" sz="7813"/>
+          </a:p>
+        </p:txBody>
+      </p:sp>
+      <p:sp>
+        <p:nvSpPr>
+          <p:cNvPr id="288" name="Rounded Rectangle 287"/>
+          <p:cNvSpPr/>
+          <p:nvPr/>
+        </p:nvSpPr>
+        <p:spPr>
+          <a:xfrm>
+            <a:off x="22772466" y="5726097"/>
+            <a:ext cx="19559879" cy="13631881"/>
+          </a:xfrm>
+          <a:prstGeom prst="roundRect">
+            <a:avLst>
+              <a:gd name="adj" fmla="val 6965"/>
+            </a:avLst>
+          </a:prstGeom>
+          <a:noFill/>
+        </p:spPr>
+        <p:style>
+          <a:lnRef idx="2">
+            <a:schemeClr val="accent1">
+              <a:shade val="50000"/>
+            </a:schemeClr>
+          </a:lnRef>
+          <a:fillRef idx="1">
+            <a:schemeClr val="accent1"/>
+          </a:fillRef>
+          <a:effectRef idx="0">
+            <a:schemeClr val="accent1"/>
+          </a:effectRef>
+          <a:fontRef idx="minor">
+            <a:schemeClr val="lt1"/>
+          </a:fontRef>
+        </p:style>
+        <p:txBody>
+          <a:bodyPr rtlCol="0" anchor="ctr"/>
+          <a:lstStyle/>
+          <a:p>
+            <a:pPr algn="ctr"/>
+            <a:endParaRPr lang="en-US" sz="7813"/>
+          </a:p>
+        </p:txBody>
+      </p:sp>
+      <p:sp>
+        <p:nvSpPr>
+          <p:cNvPr id="289" name="Rounded Rectangle 288"/>
+          <p:cNvSpPr/>
+          <p:nvPr/>
+        </p:nvSpPr>
+        <p:spPr>
+          <a:xfrm>
+            <a:off x="22771308" y="19703277"/>
+            <a:ext cx="19469849" cy="12216311"/>
+          </a:xfrm>
+          <a:prstGeom prst="roundRect">
+            <a:avLst>
+              <a:gd name="adj" fmla="val 6965"/>
+            </a:avLst>
+          </a:prstGeom>
+          <a:noFill/>
+        </p:spPr>
+        <p:style>
+          <a:lnRef idx="2">
+            <a:schemeClr val="accent1">
+              <a:shade val="50000"/>
+            </a:schemeClr>
+          </a:lnRef>
+          <a:fillRef idx="1">
+            <a:schemeClr val="accent1"/>
+          </a:fillRef>
+          <a:effectRef idx="0">
+            <a:schemeClr val="accent1"/>
+          </a:effectRef>
+          <a:fontRef idx="minor">
+            <a:schemeClr val="lt1"/>
+          </a:fontRef>
+        </p:style>
+        <p:txBody>
+          <a:bodyPr rtlCol="0" anchor="ctr"/>
+          <a:lstStyle/>
+          <a:p>
+            <a:pPr algn="ctr"/>
+            <a:endParaRPr lang="en-US" sz="7813"/>
+          </a:p>
+        </p:txBody>
+      </p:sp>
       <p:pic>
         <p:nvPicPr>
-          <p:cNvPr id="24" name="Content Placeholder 9"/>
+          <p:cNvPr id="1026" name="Picture 2"/>
+          <p:cNvPicPr>
+            <a:picLocks noChangeAspect="1" noChangeArrowheads="1"/>
+          </p:cNvPicPr>
+          <p:nvPr/>
+        </p:nvPicPr>
+        <p:blipFill>
+          <a:blip r:embed="rId8"/>
+          <a:srcRect/>
+          <a:stretch>
+            <a:fillRect/>
+          </a:stretch>
+        </p:blipFill>
+        <p:spPr bwMode="auto">
+          <a:xfrm>
+            <a:off x="2692876" y="16491305"/>
+            <a:ext cx="8399013" cy="4615674"/>
+          </a:xfrm>
+          <a:prstGeom prst="rect">
+            <a:avLst/>
+          </a:prstGeom>
+          <a:noFill/>
+          <a:ln w="9525">
+            <a:noFill/>
+            <a:miter lim="800000"/>
+            <a:headEnd/>
+            <a:tailEnd/>
+          </a:ln>
+        </p:spPr>
+      </p:pic>
+      <p:sp>
+        <p:nvSpPr>
+          <p:cNvPr id="81" name="TextBox 80"/>
+          <p:cNvSpPr txBox="1"/>
+          <p:nvPr/>
+        </p:nvSpPr>
+        <p:spPr>
+          <a:xfrm flipH="1">
+            <a:off x="4852177" y="15903216"/>
+            <a:ext cx="4215346" cy="733919"/>
+          </a:xfrm>
+          <a:prstGeom prst="rect">
+            <a:avLst/>
+          </a:prstGeom>
+          <a:noFill/>
+        </p:spPr>
+        <p:txBody>
+          <a:bodyPr wrap="square" rtlCol="0">
+            <a:spAutoFit/>
+          </a:bodyPr>
+          <a:lstStyle/>
+          <a:p>
+            <a:pPr algn="ctr"/>
+            <a:r>
+              <a:rPr lang="en-IN" sz="4169" i="1" dirty="0"/>
+              <a:t>Figure A</a:t>
+            </a:r>
+            <a:endParaRPr lang="en-IN" sz="4169" i="1" dirty="0"/>
+          </a:p>
+        </p:txBody>
+      </p:sp>
+      <p:sp>
+        <p:nvSpPr>
+          <p:cNvPr id="82" name="TextBox 81"/>
+          <p:cNvSpPr txBox="1"/>
+          <p:nvPr/>
+        </p:nvSpPr>
+        <p:spPr>
+          <a:xfrm flipH="1">
+            <a:off x="5011536" y="21155907"/>
+            <a:ext cx="4215346" cy="733919"/>
+          </a:xfrm>
+          <a:prstGeom prst="rect">
+            <a:avLst/>
+          </a:prstGeom>
+          <a:noFill/>
+        </p:spPr>
+        <p:txBody>
+          <a:bodyPr wrap="square" rtlCol="0">
+            <a:spAutoFit/>
+          </a:bodyPr>
+          <a:lstStyle/>
+          <a:p>
+            <a:pPr algn="ctr"/>
+            <a:r>
+              <a:rPr lang="en-IN" sz="4169" i="1" dirty="0"/>
+              <a:t>Figure B</a:t>
+            </a:r>
+            <a:endParaRPr lang="en-IN" sz="4169" i="1" dirty="0"/>
+          </a:p>
+        </p:txBody>
+      </p:sp>
+      <p:sp>
+        <p:nvSpPr>
+          <p:cNvPr id="40" name="TextBox 39"/>
+          <p:cNvSpPr txBox="1"/>
+          <p:nvPr/>
+        </p:nvSpPr>
+        <p:spPr>
+          <a:xfrm flipH="1">
+            <a:off x="12881079" y="17157587"/>
+            <a:ext cx="9351384" cy="733919"/>
+          </a:xfrm>
+          <a:prstGeom prst="rect">
+            <a:avLst/>
+          </a:prstGeom>
+          <a:noFill/>
+        </p:spPr>
+        <p:txBody>
+          <a:bodyPr wrap="square" rtlCol="0">
+            <a:spAutoFit/>
+          </a:bodyPr>
+          <a:lstStyle/>
+          <a:p>
+            <a:r>
+              <a:rPr lang="en-US" sz="4169" b="1" dirty="0"/>
+              <a:t>#3  </a:t>
+            </a:r>
+            <a:r>
+              <a:rPr lang="en-US" sz="4169" b="1" dirty="0"/>
+              <a:t>MPTCP should use efficient </a:t>
+            </a:r>
+            <a:r>
+              <a:rPr lang="en-US" sz="4169" b="1" dirty="0"/>
+              <a:t>paths</a:t>
+            </a:r>
+          </a:p>
+        </p:txBody>
+      </p:sp>
+      <p:sp>
+        <p:nvSpPr>
+          <p:cNvPr id="41" name="TextBox 40"/>
+          <p:cNvSpPr txBox="1"/>
+          <p:nvPr/>
+        </p:nvSpPr>
+        <p:spPr>
+          <a:xfrm>
+            <a:off x="25816619" y="14439603"/>
+            <a:ext cx="1899072" cy="1294650"/>
+          </a:xfrm>
+          <a:prstGeom prst="rect">
+            <a:avLst/>
+          </a:prstGeom>
+          <a:noFill/>
+        </p:spPr>
+        <p:txBody>
+          <a:bodyPr wrap="square" rtlCol="0">
+            <a:spAutoFit/>
+          </a:bodyPr>
+          <a:lstStyle/>
+          <a:p>
+            <a:endParaRPr lang="en-IN" sz="7813" dirty="0"/>
+          </a:p>
+        </p:txBody>
+      </p:sp>
+      <p:sp>
+        <p:nvSpPr>
+          <p:cNvPr id="43" name="TextBox 42"/>
+          <p:cNvSpPr txBox="1"/>
+          <p:nvPr/>
+        </p:nvSpPr>
+        <p:spPr>
+          <a:xfrm>
+            <a:off x="24715822" y="14583982"/>
+            <a:ext cx="3144252" cy="1294650"/>
+          </a:xfrm>
+          <a:prstGeom prst="rect">
+            <a:avLst/>
+          </a:prstGeom>
+          <a:noFill/>
+        </p:spPr>
+        <p:txBody>
+          <a:bodyPr wrap="square" rtlCol="0">
+            <a:spAutoFit/>
+          </a:bodyPr>
+          <a:lstStyle/>
+          <a:p>
+            <a:endParaRPr lang="en-IN" sz="7813" dirty="0"/>
+          </a:p>
+        </p:txBody>
+      </p:sp>
+      <p:sp>
+        <p:nvSpPr>
+          <p:cNvPr id="44" name="TextBox 43"/>
+          <p:cNvSpPr txBox="1"/>
+          <p:nvPr/>
+        </p:nvSpPr>
+        <p:spPr>
+          <a:xfrm>
+            <a:off x="24860201" y="14376331"/>
+            <a:ext cx="3144252" cy="1294650"/>
+          </a:xfrm>
+          <a:prstGeom prst="rect">
+            <a:avLst/>
+          </a:prstGeom>
+          <a:noFill/>
+        </p:spPr>
+        <p:txBody>
+          <a:bodyPr wrap="square" rtlCol="0">
+            <a:spAutoFit/>
+          </a:bodyPr>
+          <a:lstStyle/>
+          <a:p>
+            <a:endParaRPr lang="en-IN" sz="7813" dirty="0"/>
+          </a:p>
+        </p:txBody>
+      </p:sp>
+      <p:sp>
+        <p:nvSpPr>
+          <p:cNvPr id="45" name="TextBox 44"/>
+          <p:cNvSpPr txBox="1"/>
+          <p:nvPr/>
+        </p:nvSpPr>
+        <p:spPr>
+          <a:xfrm>
+            <a:off x="25611934" y="12077533"/>
+            <a:ext cx="3144252" cy="529697"/>
+          </a:xfrm>
+          <a:prstGeom prst="rect">
+            <a:avLst/>
+          </a:prstGeom>
+          <a:noFill/>
+        </p:spPr>
+        <p:txBody>
+          <a:bodyPr wrap="square" rtlCol="0">
+            <a:spAutoFit/>
+          </a:bodyPr>
+          <a:lstStyle/>
+          <a:p>
+            <a:pPr algn="ctr"/>
+            <a:r>
+              <a:rPr lang="en-IN" sz="2842" i="1" dirty="0"/>
+              <a:t>Graph 3</a:t>
+            </a:r>
+            <a:endParaRPr lang="en-IN" sz="2842" i="1" dirty="0"/>
+          </a:p>
+        </p:txBody>
+      </p:sp>
+      <p:sp>
+        <p:nvSpPr>
+          <p:cNvPr id="46" name="TextBox 45"/>
+          <p:cNvSpPr txBox="1"/>
+          <p:nvPr/>
+        </p:nvSpPr>
+        <p:spPr>
+          <a:xfrm>
+            <a:off x="34062208" y="12371996"/>
+            <a:ext cx="3144252" cy="529697"/>
+          </a:xfrm>
+          <a:prstGeom prst="rect">
+            <a:avLst/>
+          </a:prstGeom>
+          <a:noFill/>
+        </p:spPr>
+        <p:txBody>
+          <a:bodyPr wrap="square" rtlCol="0">
+            <a:spAutoFit/>
+          </a:bodyPr>
+          <a:lstStyle/>
+          <a:p>
+            <a:pPr algn="ctr"/>
+            <a:r>
+              <a:rPr lang="en-IN" sz="2842" i="1" dirty="0"/>
+              <a:t>Graph 4</a:t>
+            </a:r>
+            <a:endParaRPr lang="en-IN" sz="2842" i="1" dirty="0"/>
+          </a:p>
+        </p:txBody>
+      </p:sp>
+      <p:sp>
+        <p:nvSpPr>
+          <p:cNvPr id="47" name="TextBox 46"/>
+          <p:cNvSpPr txBox="1"/>
+          <p:nvPr/>
+        </p:nvSpPr>
+        <p:spPr>
+          <a:xfrm>
+            <a:off x="25768665" y="18914672"/>
+            <a:ext cx="3144252" cy="529697"/>
+          </a:xfrm>
+          <a:prstGeom prst="rect">
+            <a:avLst/>
+          </a:prstGeom>
+          <a:noFill/>
+        </p:spPr>
+        <p:txBody>
+          <a:bodyPr wrap="square" rtlCol="0">
+            <a:spAutoFit/>
+          </a:bodyPr>
+          <a:lstStyle/>
+          <a:p>
+            <a:pPr algn="ctr"/>
+            <a:r>
+              <a:rPr lang="en-IN" sz="2842" i="1" dirty="0"/>
+              <a:t>Graph 5</a:t>
+            </a:r>
+            <a:endParaRPr lang="en-IN" sz="2842" i="1" dirty="0"/>
+          </a:p>
+        </p:txBody>
+      </p:sp>
+      <p:sp>
+        <p:nvSpPr>
+          <p:cNvPr id="48" name="TextBox 47"/>
+          <p:cNvSpPr txBox="1"/>
+          <p:nvPr/>
+        </p:nvSpPr>
+        <p:spPr>
+          <a:xfrm>
+            <a:off x="34207140" y="18938209"/>
+            <a:ext cx="3144252" cy="529697"/>
+          </a:xfrm>
+          <a:prstGeom prst="rect">
+            <a:avLst/>
+          </a:prstGeom>
+          <a:noFill/>
+        </p:spPr>
+        <p:txBody>
+          <a:bodyPr wrap="square" rtlCol="0">
+            <a:spAutoFit/>
+          </a:bodyPr>
+          <a:lstStyle/>
+          <a:p>
+            <a:pPr algn="ctr"/>
+            <a:r>
+              <a:rPr lang="en-IN" sz="2842" i="1" dirty="0"/>
+              <a:t>Graph 6</a:t>
+            </a:r>
+            <a:endParaRPr lang="en-IN" sz="2842" i="1" dirty="0"/>
+          </a:p>
+        </p:txBody>
+      </p:sp>
+      <p:sp>
+        <p:nvSpPr>
+          <p:cNvPr id="50" name="TextBox 49"/>
+          <p:cNvSpPr txBox="1"/>
+          <p:nvPr/>
+        </p:nvSpPr>
+        <p:spPr>
+          <a:xfrm>
+            <a:off x="12822183" y="14066950"/>
+            <a:ext cx="9351386" cy="3008516"/>
+          </a:xfrm>
+          <a:prstGeom prst="rect">
+            <a:avLst/>
+          </a:prstGeom>
+          <a:noFill/>
+        </p:spPr>
+        <p:txBody>
+          <a:bodyPr wrap="square" rtlCol="0">
+            <a:spAutoFit/>
+          </a:bodyPr>
+          <a:lstStyle/>
+          <a:p>
+            <a:pPr algn="just"/>
+            <a:r>
+              <a:rPr lang="en-IN" sz="3790" dirty="0"/>
+              <a:t>As observed in the above graph, </a:t>
+            </a:r>
+          </a:p>
+          <a:p>
+            <a:pPr algn="just">
+              <a:buFont typeface="Arial" pitchFamily="34" charset="0"/>
+              <a:buChar char="•"/>
+            </a:pPr>
+            <a:r>
+              <a:rPr lang="en-IN" sz="3790" dirty="0"/>
+              <a:t>MPTCP follows the fair share property while increasing no of sub flows</a:t>
+            </a:r>
+          </a:p>
+          <a:p>
+            <a:pPr algn="just">
+              <a:buFont typeface="Arial" pitchFamily="34" charset="0"/>
+              <a:buChar char="•"/>
+            </a:pPr>
+            <a:r>
+              <a:rPr lang="en-IN" sz="3790" dirty="0"/>
+              <a:t>It performs as well as TCP when there is competing traffic</a:t>
+            </a:r>
+            <a:endParaRPr lang="en-IN" sz="3790" dirty="0"/>
+          </a:p>
+        </p:txBody>
+      </p:sp>
+      <p:pic>
+        <p:nvPicPr>
+          <p:cNvPr id="52" name="Picture 51"/>
           <p:cNvPicPr>
             <a:picLocks noChangeAspect="1"/>
           </p:cNvPicPr>
           <p:nvPr/>
         </p:nvPicPr>
         <p:blipFill>
-          <a:blip r:embed="rId8">
+          <a:blip r:embed="rId9">
             <a:extLst>
               <a:ext uri="{28A0092B-C50C-407E-A947-70E740481C1C}">
                 <a14:useLocalDpi xmlns:a14="http://schemas.microsoft.com/office/drawing/2010/main" val="0"/>
@@ -4217,14 +5082,1876 @@
         </p:blipFill>
         <p:spPr>
           <a:xfrm>
-            <a:off x="19306043" y="25722077"/>
-            <a:ext cx="6441790" cy="4831343"/>
+            <a:off x="24215395" y="13595957"/>
+            <a:ext cx="7103837" cy="5327879"/>
           </a:xfrm>
           <a:prstGeom prst="rect">
             <a:avLst/>
           </a:prstGeom>
         </p:spPr>
       </p:pic>
+      <p:sp>
+        <p:nvSpPr>
+          <p:cNvPr id="2" name="TextBox 1"/>
+          <p:cNvSpPr txBox="1"/>
+          <p:nvPr/>
+        </p:nvSpPr>
+        <p:spPr>
+          <a:xfrm>
+            <a:off x="31255823" y="17506078"/>
+            <a:ext cx="956191" cy="296363"/>
+          </a:xfrm>
+          <a:prstGeom prst="rect">
+            <a:avLst/>
+          </a:prstGeom>
+          <a:noFill/>
+        </p:spPr>
+        <p:txBody>
+          <a:bodyPr wrap="square" rtlCol="0">
+            <a:spAutoFit/>
+          </a:bodyPr>
+          <a:lstStyle/>
+          <a:p>
+            <a:r>
+              <a:rPr lang="en-US" sz="1326" dirty="0" err="1">
+                <a:latin typeface="Verdana" panose="020B0604030504040204" pitchFamily="34" charset="0"/>
+                <a:ea typeface="Verdana" panose="020B0604030504040204" pitchFamily="34" charset="0"/>
+                <a:cs typeface="Verdana" panose="020B0604030504040204" pitchFamily="34" charset="0"/>
+              </a:rPr>
+              <a:t>K</a:t>
+            </a:r>
+            <a:r>
+              <a:rPr lang="en-US" sz="1326" dirty="0" err="1">
+                <a:latin typeface="Verdana" panose="020B0604030504040204" pitchFamily="34" charset="0"/>
+                <a:ea typeface="Verdana" panose="020B0604030504040204" pitchFamily="34" charset="0"/>
+                <a:cs typeface="Verdana" panose="020B0604030504040204" pitchFamily="34" charset="0"/>
+              </a:rPr>
+              <a:t>Bps</a:t>
+            </a:r>
+            <a:endParaRPr lang="en-US" sz="1326" dirty="0">
+              <a:latin typeface="Verdana" panose="020B0604030504040204" pitchFamily="34" charset="0"/>
+              <a:ea typeface="Verdana" panose="020B0604030504040204" pitchFamily="34" charset="0"/>
+              <a:cs typeface="Verdana" panose="020B0604030504040204" pitchFamily="34" charset="0"/>
+            </a:endParaRPr>
+          </a:p>
+        </p:txBody>
+      </p:sp>
+      <p:sp>
+        <p:nvSpPr>
+          <p:cNvPr id="53" name="TextBox 52"/>
+          <p:cNvSpPr txBox="1"/>
+          <p:nvPr/>
+        </p:nvSpPr>
+        <p:spPr>
+          <a:xfrm>
+            <a:off x="31255823" y="17722646"/>
+            <a:ext cx="956191" cy="296363"/>
+          </a:xfrm>
+          <a:prstGeom prst="rect">
+            <a:avLst/>
+          </a:prstGeom>
+          <a:noFill/>
+        </p:spPr>
+        <p:txBody>
+          <a:bodyPr wrap="square" rtlCol="0">
+            <a:spAutoFit/>
+          </a:bodyPr>
+          <a:lstStyle/>
+          <a:p>
+            <a:r>
+              <a:rPr lang="en-US" sz="1326" dirty="0" err="1">
+                <a:latin typeface="Verdana" panose="020B0604030504040204" pitchFamily="34" charset="0"/>
+                <a:ea typeface="Verdana" panose="020B0604030504040204" pitchFamily="34" charset="0"/>
+                <a:cs typeface="Verdana" panose="020B0604030504040204" pitchFamily="34" charset="0"/>
+              </a:rPr>
+              <a:t>K</a:t>
+            </a:r>
+            <a:r>
+              <a:rPr lang="en-US" sz="1326" dirty="0" err="1">
+                <a:latin typeface="Verdana" panose="020B0604030504040204" pitchFamily="34" charset="0"/>
+                <a:ea typeface="Verdana" panose="020B0604030504040204" pitchFamily="34" charset="0"/>
+                <a:cs typeface="Verdana" panose="020B0604030504040204" pitchFamily="34" charset="0"/>
+              </a:rPr>
+              <a:t>Bps</a:t>
+            </a:r>
+            <a:endParaRPr lang="en-US" sz="1137" dirty="0">
+              <a:latin typeface="Verdana" panose="020B0604030504040204" pitchFamily="34" charset="0"/>
+              <a:ea typeface="Verdana" panose="020B0604030504040204" pitchFamily="34" charset="0"/>
+              <a:cs typeface="Verdana" panose="020B0604030504040204" pitchFamily="34" charset="0"/>
+            </a:endParaRPr>
+          </a:p>
+        </p:txBody>
+      </p:sp>
+      <p:sp>
+        <p:nvSpPr>
+          <p:cNvPr id="54" name="TextBox 53"/>
+          <p:cNvSpPr txBox="1"/>
+          <p:nvPr/>
+        </p:nvSpPr>
+        <p:spPr>
+          <a:xfrm>
+            <a:off x="27866759" y="18608786"/>
+            <a:ext cx="1341202" cy="296363"/>
+          </a:xfrm>
+          <a:prstGeom prst="rect">
+            <a:avLst/>
+          </a:prstGeom>
+          <a:noFill/>
+        </p:spPr>
+        <p:txBody>
+          <a:bodyPr wrap="square" rtlCol="0">
+            <a:spAutoFit/>
+          </a:bodyPr>
+          <a:lstStyle/>
+          <a:p>
+            <a:r>
+              <a:rPr lang="en-US" sz="1326" dirty="0">
+                <a:latin typeface="Verdana" panose="020B0604030504040204" pitchFamily="34" charset="0"/>
+                <a:ea typeface="Verdana" panose="020B0604030504040204" pitchFamily="34" charset="0"/>
+                <a:cs typeface="Verdana" panose="020B0604030504040204" pitchFamily="34" charset="0"/>
+              </a:rPr>
+              <a:t>(in seconds)</a:t>
+            </a:r>
+            <a:endParaRPr lang="en-US" sz="1137" dirty="0">
+              <a:latin typeface="Verdana" panose="020B0604030504040204" pitchFamily="34" charset="0"/>
+              <a:ea typeface="Verdana" panose="020B0604030504040204" pitchFamily="34" charset="0"/>
+              <a:cs typeface="Verdana" panose="020B0604030504040204" pitchFamily="34" charset="0"/>
+            </a:endParaRPr>
+          </a:p>
+        </p:txBody>
+      </p:sp>
+      <p:sp>
+        <p:nvSpPr>
+          <p:cNvPr id="55" name="TextBox 54"/>
+          <p:cNvSpPr txBox="1"/>
+          <p:nvPr/>
+        </p:nvSpPr>
+        <p:spPr>
+          <a:xfrm>
+            <a:off x="36059199" y="18455325"/>
+            <a:ext cx="1341202" cy="296363"/>
+          </a:xfrm>
+          <a:prstGeom prst="rect">
+            <a:avLst/>
+          </a:prstGeom>
+          <a:noFill/>
+        </p:spPr>
+        <p:txBody>
+          <a:bodyPr wrap="square" rtlCol="0">
+            <a:spAutoFit/>
+          </a:bodyPr>
+          <a:lstStyle/>
+          <a:p>
+            <a:r>
+              <a:rPr lang="en-US" sz="1326" dirty="0">
+                <a:latin typeface="Verdana" panose="020B0604030504040204" pitchFamily="34" charset="0"/>
+                <a:ea typeface="Verdana" panose="020B0604030504040204" pitchFamily="34" charset="0"/>
+                <a:cs typeface="Verdana" panose="020B0604030504040204" pitchFamily="34" charset="0"/>
+              </a:rPr>
+              <a:t>(in seconds)</a:t>
+            </a:r>
+            <a:endParaRPr lang="en-US" sz="1137" dirty="0">
+              <a:latin typeface="Verdana" panose="020B0604030504040204" pitchFamily="34" charset="0"/>
+              <a:ea typeface="Verdana" panose="020B0604030504040204" pitchFamily="34" charset="0"/>
+              <a:cs typeface="Verdana" panose="020B0604030504040204" pitchFamily="34" charset="0"/>
+            </a:endParaRPr>
+          </a:p>
+        </p:txBody>
+      </p:sp>
+      <p:sp>
+        <p:nvSpPr>
+          <p:cNvPr id="56" name="TextBox 55"/>
+          <p:cNvSpPr txBox="1"/>
+          <p:nvPr/>
+        </p:nvSpPr>
+        <p:spPr>
+          <a:xfrm>
+            <a:off x="35566290" y="12140434"/>
+            <a:ext cx="1341202" cy="296363"/>
+          </a:xfrm>
+          <a:prstGeom prst="rect">
+            <a:avLst/>
+          </a:prstGeom>
+          <a:noFill/>
+        </p:spPr>
+        <p:txBody>
+          <a:bodyPr wrap="square" rtlCol="0">
+            <a:spAutoFit/>
+          </a:bodyPr>
+          <a:lstStyle/>
+          <a:p>
+            <a:r>
+              <a:rPr lang="en-US" sz="1326" dirty="0">
+                <a:latin typeface="Verdana" panose="020B0604030504040204" pitchFamily="34" charset="0"/>
+                <a:ea typeface="Verdana" panose="020B0604030504040204" pitchFamily="34" charset="0"/>
+                <a:cs typeface="Verdana" panose="020B0604030504040204" pitchFamily="34" charset="0"/>
+              </a:rPr>
+              <a:t>(in seconds)</a:t>
+            </a:r>
+            <a:endParaRPr lang="en-US" sz="1137" dirty="0">
+              <a:latin typeface="Verdana" panose="020B0604030504040204" pitchFamily="34" charset="0"/>
+              <a:ea typeface="Verdana" panose="020B0604030504040204" pitchFamily="34" charset="0"/>
+              <a:cs typeface="Verdana" panose="020B0604030504040204" pitchFamily="34" charset="0"/>
+            </a:endParaRPr>
+          </a:p>
+        </p:txBody>
+      </p:sp>
+      <p:graphicFrame>
+        <p:nvGraphicFramePr>
+          <p:cNvPr id="14" name="Table 13"/>
+          <p:cNvGraphicFramePr>
+            <a:graphicFrameLocks noGrp="1"/>
+          </p:cNvGraphicFramePr>
+          <p:nvPr>
+            <p:extLst>
+              <p:ext uri="{D42A27DB-BD31-4B8C-83A1-F6EECF244321}">
+                <p14:modId xmlns:p14="http://schemas.microsoft.com/office/powerpoint/2010/main" val="869695518"/>
+              </p:ext>
+            </p:extLst>
+          </p:nvPr>
+        </p:nvGraphicFramePr>
+        <p:xfrm>
+          <a:off x="37929108" y="10073243"/>
+          <a:ext cx="2896571" cy="1650019"/>
+        </p:xfrm>
+        <a:graphic>
+          <a:graphicData uri="http://schemas.openxmlformats.org/drawingml/2006/table">
+            <a:tbl>
+              <a:tblPr firstRow="1" bandRow="1">
+                <a:tableStyleId>{5940675A-B579-460E-94D1-54222C63F5DA}</a:tableStyleId>
+              </a:tblPr>
+              <a:tblGrid>
+                <a:gridCol w="965524"/>
+                <a:gridCol w="1260804"/>
+                <a:gridCol w="670243"/>
+              </a:tblGrid>
+              <a:tr h="606392">
+                <a:tc>
+                  <a:txBody>
+                    <a:bodyPr/>
+                    <a:lstStyle/>
+                    <a:p>
+                      <a:r>
+                        <a:rPr lang="en-US" sz="1100" baseline="0" dirty="0" smtClean="0"/>
+                        <a:t>Congestion Control</a:t>
+                      </a:r>
+                      <a:endParaRPr lang="en-US" sz="1100" baseline="0" dirty="0"/>
+                    </a:p>
+                  </a:txBody>
+                  <a:tcPr marL="86627" marR="86627" marT="43314" marB="43314"/>
+                </a:tc>
+                <a:tc>
+                  <a:txBody>
+                    <a:bodyPr/>
+                    <a:lstStyle/>
+                    <a:p>
+                      <a:r>
+                        <a:rPr lang="en-US" sz="1100" baseline="0" dirty="0" smtClean="0"/>
+                        <a:t>Time in Seconds to transfer a 1GB File</a:t>
+                      </a:r>
+                      <a:endParaRPr lang="en-US" sz="1100" baseline="0" dirty="0"/>
+                    </a:p>
+                  </a:txBody>
+                  <a:tcPr marL="86627" marR="86627" marT="43314" marB="43314"/>
+                </a:tc>
+                <a:tc>
+                  <a:txBody>
+                    <a:bodyPr/>
+                    <a:lstStyle/>
+                    <a:p>
+                      <a:r>
+                        <a:rPr lang="en-US" sz="1100" baseline="0" dirty="0" smtClean="0"/>
+                        <a:t>Mean in </a:t>
+                      </a:r>
+                      <a:r>
+                        <a:rPr lang="en-US" sz="1100" baseline="0" dirty="0" err="1" smtClean="0"/>
+                        <a:t>KBps</a:t>
+                      </a:r>
+                      <a:endParaRPr lang="en-US" sz="1100" baseline="0" dirty="0"/>
+                    </a:p>
+                  </a:txBody>
+                  <a:tcPr marL="86627" marR="86627" marT="43314" marB="43314"/>
+                </a:tc>
+              </a:tr>
+              <a:tr h="259882">
+                <a:tc>
+                  <a:txBody>
+                    <a:bodyPr/>
+                    <a:lstStyle/>
+                    <a:p>
+                      <a:r>
+                        <a:rPr lang="en-US" sz="1100" b="1" baseline="0" dirty="0" smtClean="0">
+                          <a:solidFill>
+                            <a:srgbClr val="00B050"/>
+                          </a:solidFill>
+                        </a:rPr>
+                        <a:t>OLIA</a:t>
+                      </a:r>
+                      <a:endParaRPr lang="en-US" sz="1100" b="1" baseline="0" dirty="0">
+                        <a:solidFill>
+                          <a:srgbClr val="00B050"/>
+                        </a:solidFill>
+                      </a:endParaRPr>
+                    </a:p>
+                  </a:txBody>
+                  <a:tcPr marL="86627" marR="86627" marT="43314" marB="43314"/>
+                </a:tc>
+                <a:tc>
+                  <a:txBody>
+                    <a:bodyPr/>
+                    <a:lstStyle/>
+                    <a:p>
+                      <a:r>
+                        <a:rPr lang="en-US" sz="1100" b="1" baseline="0" dirty="0" smtClean="0">
+                          <a:solidFill>
+                            <a:srgbClr val="00B050"/>
+                          </a:solidFill>
+                        </a:rPr>
+                        <a:t>114.350</a:t>
+                      </a:r>
+                      <a:endParaRPr lang="en-US" sz="1100" b="1" baseline="0" dirty="0">
+                        <a:solidFill>
+                          <a:srgbClr val="00B050"/>
+                        </a:solidFill>
+                      </a:endParaRPr>
+                    </a:p>
+                  </a:txBody>
+                  <a:tcPr marL="86627" marR="86627" marT="43314" marB="43314"/>
+                </a:tc>
+                <a:tc>
+                  <a:txBody>
+                    <a:bodyPr/>
+                    <a:lstStyle/>
+                    <a:p>
+                      <a:r>
+                        <a:rPr lang="en-US" sz="1100" b="1" baseline="0" dirty="0" smtClean="0">
+                          <a:solidFill>
+                            <a:srgbClr val="00B050"/>
+                          </a:solidFill>
+                        </a:rPr>
+                        <a:t>9830</a:t>
+                      </a:r>
+                      <a:endParaRPr lang="en-US" sz="1100" b="1" baseline="0" dirty="0">
+                        <a:solidFill>
+                          <a:srgbClr val="00B050"/>
+                        </a:solidFill>
+                      </a:endParaRPr>
+                    </a:p>
+                  </a:txBody>
+                  <a:tcPr marL="86627" marR="86627" marT="43314" marB="43314"/>
+                </a:tc>
+              </a:tr>
+              <a:tr h="263981">
+                <a:tc>
+                  <a:txBody>
+                    <a:bodyPr/>
+                    <a:lstStyle/>
+                    <a:p>
+                      <a:r>
+                        <a:rPr lang="en-US" sz="1100" baseline="0" dirty="0" smtClean="0"/>
+                        <a:t>LIA</a:t>
+                      </a:r>
+                      <a:endParaRPr lang="en-US" sz="1100" baseline="0" dirty="0"/>
+                    </a:p>
+                  </a:txBody>
+                  <a:tcPr marL="86627" marR="86627" marT="43314" marB="43314"/>
+                </a:tc>
+                <a:tc>
+                  <a:txBody>
+                    <a:bodyPr/>
+                    <a:lstStyle/>
+                    <a:p>
+                      <a:r>
+                        <a:rPr lang="en-US" sz="1100" baseline="0" dirty="0" smtClean="0"/>
+                        <a:t>118.071</a:t>
+                      </a:r>
+                      <a:endParaRPr lang="en-US" sz="1100" baseline="0" dirty="0"/>
+                    </a:p>
+                  </a:txBody>
+                  <a:tcPr marL="86627" marR="86627" marT="43314" marB="43314"/>
+                </a:tc>
+                <a:tc>
+                  <a:txBody>
+                    <a:bodyPr/>
+                    <a:lstStyle/>
+                    <a:p>
+                      <a:r>
+                        <a:rPr lang="en-US" sz="1100" baseline="0" dirty="0" smtClean="0"/>
+                        <a:t>10387</a:t>
+                      </a:r>
+                      <a:endParaRPr lang="en-US" sz="1100" baseline="0" dirty="0"/>
+                    </a:p>
+                  </a:txBody>
+                  <a:tcPr marL="86627" marR="86627" marT="43314" marB="43314"/>
+                </a:tc>
+              </a:tr>
+              <a:tr h="259882">
+                <a:tc>
+                  <a:txBody>
+                    <a:bodyPr/>
+                    <a:lstStyle/>
+                    <a:p>
+                      <a:r>
+                        <a:rPr lang="en-US" sz="1100" baseline="0" dirty="0" smtClean="0"/>
+                        <a:t>BALIA</a:t>
+                      </a:r>
+                      <a:endParaRPr lang="en-US" sz="1100" baseline="0" dirty="0"/>
+                    </a:p>
+                  </a:txBody>
+                  <a:tcPr marL="86627" marR="86627" marT="43314" marB="43314"/>
+                </a:tc>
+                <a:tc>
+                  <a:txBody>
+                    <a:bodyPr/>
+                    <a:lstStyle/>
+                    <a:p>
+                      <a:r>
+                        <a:rPr lang="en-US" sz="1100" baseline="0" dirty="0" smtClean="0"/>
+                        <a:t>159.006</a:t>
+                      </a:r>
+                      <a:endParaRPr lang="en-US" sz="1100" baseline="0" dirty="0"/>
+                    </a:p>
+                  </a:txBody>
+                  <a:tcPr marL="86627" marR="86627" marT="43314" marB="43314"/>
+                </a:tc>
+                <a:tc>
+                  <a:txBody>
+                    <a:bodyPr/>
+                    <a:lstStyle/>
+                    <a:p>
+                      <a:r>
+                        <a:rPr lang="en-US" sz="1100" baseline="0" dirty="0" smtClean="0"/>
+                        <a:t>6413</a:t>
+                      </a:r>
+                      <a:endParaRPr lang="en-US" sz="1100" baseline="0" dirty="0"/>
+                    </a:p>
+                  </a:txBody>
+                  <a:tcPr marL="86627" marR="86627" marT="43314" marB="43314"/>
+                </a:tc>
+              </a:tr>
+              <a:tr h="259882">
+                <a:tc>
+                  <a:txBody>
+                    <a:bodyPr/>
+                    <a:lstStyle/>
+                    <a:p>
+                      <a:r>
+                        <a:rPr lang="en-US" sz="1100" baseline="0" dirty="0" err="1" smtClean="0"/>
+                        <a:t>wVegas</a:t>
+                      </a:r>
+                      <a:endParaRPr lang="en-US" sz="1100" baseline="0" dirty="0"/>
+                    </a:p>
+                  </a:txBody>
+                  <a:tcPr marL="86627" marR="86627" marT="43314" marB="43314"/>
+                </a:tc>
+                <a:tc>
+                  <a:txBody>
+                    <a:bodyPr/>
+                    <a:lstStyle/>
+                    <a:p>
+                      <a:r>
+                        <a:rPr lang="en-US" sz="1100" baseline="0" dirty="0" smtClean="0"/>
+                        <a:t>120.091</a:t>
+                      </a:r>
+                      <a:endParaRPr lang="en-US" sz="1100" baseline="0" dirty="0"/>
+                    </a:p>
+                  </a:txBody>
+                  <a:tcPr marL="86627" marR="86627" marT="43314" marB="43314"/>
+                </a:tc>
+                <a:tc>
+                  <a:txBody>
+                    <a:bodyPr/>
+                    <a:lstStyle/>
+                    <a:p>
+                      <a:r>
+                        <a:rPr lang="en-US" sz="1100" baseline="0" dirty="0" smtClean="0"/>
+                        <a:t>1203</a:t>
+                      </a:r>
+                      <a:endParaRPr lang="en-US" sz="1100" baseline="0" dirty="0"/>
+                    </a:p>
+                  </a:txBody>
+                  <a:tcPr marL="86627" marR="86627" marT="43314" marB="43314"/>
+                </a:tc>
+              </a:tr>
+            </a:tbl>
+          </a:graphicData>
+        </a:graphic>
+      </p:graphicFrame>
+      <p:pic>
+        <p:nvPicPr>
+          <p:cNvPr id="62" name="Picture 61"/>
+          <p:cNvPicPr>
+            <a:picLocks noChangeAspect="1"/>
+          </p:cNvPicPr>
+          <p:nvPr/>
+        </p:nvPicPr>
+        <p:blipFill>
+          <a:blip r:embed="rId10">
+            <a:extLst>
+              <a:ext uri="{28A0092B-C50C-407E-A947-70E740481C1C}">
+                <a14:useLocalDpi xmlns:a14="http://schemas.microsoft.com/office/drawing/2010/main" val="0"/>
+              </a:ext>
+            </a:extLst>
+          </a:blip>
+          <a:stretch>
+            <a:fillRect/>
+          </a:stretch>
+        </p:blipFill>
+        <p:spPr>
+          <a:xfrm>
+            <a:off x="14123374" y="8596661"/>
+            <a:ext cx="6870846" cy="5153136"/>
+          </a:xfrm>
+          <a:prstGeom prst="rect">
+            <a:avLst/>
+          </a:prstGeom>
+        </p:spPr>
+      </p:pic>
+      <p:sp>
+        <p:nvSpPr>
+          <p:cNvPr id="167" name="TextBox 166"/>
+          <p:cNvSpPr txBox="1"/>
+          <p:nvPr/>
+        </p:nvSpPr>
+        <p:spPr>
+          <a:xfrm flipH="1">
+            <a:off x="12817915" y="19633458"/>
+            <a:ext cx="9351384" cy="733919"/>
+          </a:xfrm>
+          <a:prstGeom prst="rect">
+            <a:avLst/>
+          </a:prstGeom>
+          <a:noFill/>
+        </p:spPr>
+        <p:txBody>
+          <a:bodyPr wrap="square" rtlCol="0">
+            <a:spAutoFit/>
+          </a:bodyPr>
+          <a:lstStyle/>
+          <a:p>
+            <a:r>
+              <a:rPr lang="en-US" sz="4169" b="1" dirty="0"/>
+              <a:t>#4  Efficient Resource Utilization</a:t>
+            </a:r>
+          </a:p>
+        </p:txBody>
+      </p:sp>
+      <p:sp>
+        <p:nvSpPr>
+          <p:cNvPr id="183" name="TextBox 182"/>
+          <p:cNvSpPr txBox="1"/>
+          <p:nvPr/>
+        </p:nvSpPr>
+        <p:spPr>
+          <a:xfrm>
+            <a:off x="12822179" y="17780504"/>
+            <a:ext cx="9351387" cy="1842043"/>
+          </a:xfrm>
+          <a:prstGeom prst="rect">
+            <a:avLst/>
+          </a:prstGeom>
+          <a:noFill/>
+        </p:spPr>
+        <p:txBody>
+          <a:bodyPr wrap="square" rtlCol="0">
+            <a:spAutoFit/>
+          </a:bodyPr>
+          <a:lstStyle/>
+          <a:p>
+            <a:pPr algn="just"/>
+            <a:r>
+              <a:rPr lang="en-IN" sz="3790" dirty="0"/>
+              <a:t>In the experimental setup, MPTCP always preferred Ethernet in spite of increasing RTT delay or packet loss on it.</a:t>
+            </a:r>
+            <a:endParaRPr lang="en-IN" sz="3790" dirty="0"/>
+          </a:p>
+        </p:txBody>
+      </p:sp>
+      <p:sp>
+        <p:nvSpPr>
+          <p:cNvPr id="186" name="TextBox 185"/>
+          <p:cNvSpPr txBox="1"/>
+          <p:nvPr/>
+        </p:nvSpPr>
+        <p:spPr>
+          <a:xfrm>
+            <a:off x="15946302" y="13704118"/>
+            <a:ext cx="3144252" cy="529697"/>
+          </a:xfrm>
+          <a:prstGeom prst="rect">
+            <a:avLst/>
+          </a:prstGeom>
+          <a:noFill/>
+        </p:spPr>
+        <p:txBody>
+          <a:bodyPr wrap="square" rtlCol="0">
+            <a:spAutoFit/>
+          </a:bodyPr>
+          <a:lstStyle/>
+          <a:p>
+            <a:pPr algn="ctr"/>
+            <a:r>
+              <a:rPr lang="en-IN" sz="2842" i="1" dirty="0"/>
+              <a:t>Graph 1</a:t>
+            </a:r>
+            <a:endParaRPr lang="en-IN" sz="2842" i="1" dirty="0"/>
+          </a:p>
+        </p:txBody>
+      </p:sp>
+      <p:pic>
+        <p:nvPicPr>
+          <p:cNvPr id="63" name="Picture 62"/>
+          <p:cNvPicPr>
+            <a:picLocks noChangeAspect="1"/>
+          </p:cNvPicPr>
+          <p:nvPr/>
+        </p:nvPicPr>
+        <p:blipFill>
+          <a:blip r:embed="rId11">
+            <a:extLst>
+              <a:ext uri="{28A0092B-C50C-407E-A947-70E740481C1C}">
+                <a14:useLocalDpi xmlns:a14="http://schemas.microsoft.com/office/drawing/2010/main" val="0"/>
+              </a:ext>
+            </a:extLst>
+          </a:blip>
+          <a:stretch>
+            <a:fillRect/>
+          </a:stretch>
+        </p:blipFill>
+        <p:spPr>
+          <a:xfrm>
+            <a:off x="14818116" y="22386885"/>
+            <a:ext cx="5329237" cy="3996929"/>
+          </a:xfrm>
+          <a:prstGeom prst="rect">
+            <a:avLst/>
+          </a:prstGeom>
+        </p:spPr>
+      </p:pic>
+      <p:grpSp>
+        <p:nvGrpSpPr>
+          <p:cNvPr id="154" name="Group 153"/>
+          <p:cNvGrpSpPr/>
+          <p:nvPr/>
+        </p:nvGrpSpPr>
+        <p:grpSpPr>
+          <a:xfrm>
+            <a:off x="13245848" y="20621412"/>
+            <a:ext cx="8286892" cy="7602379"/>
+            <a:chOff x="3801979" y="22186232"/>
+            <a:chExt cx="7226969" cy="6200449"/>
+          </a:xfrm>
+        </p:grpSpPr>
+        <p:cxnSp>
+          <p:nvCxnSpPr>
+            <p:cNvPr id="155" name="Straight Connector 154"/>
+            <p:cNvCxnSpPr/>
+            <p:nvPr/>
+          </p:nvCxnSpPr>
+          <p:spPr>
+            <a:xfrm flipH="1">
+              <a:off x="4644190" y="23477797"/>
+              <a:ext cx="48126" cy="3617319"/>
+            </a:xfrm>
+            <a:prstGeom prst="line">
+              <a:avLst/>
+            </a:prstGeom>
+          </p:spPr>
+          <p:style>
+            <a:lnRef idx="1">
+              <a:schemeClr val="accent1"/>
+            </a:lnRef>
+            <a:fillRef idx="0">
+              <a:schemeClr val="accent1"/>
+            </a:fillRef>
+            <a:effectRef idx="0">
+              <a:schemeClr val="accent1"/>
+            </a:effectRef>
+            <a:fontRef idx="minor">
+              <a:schemeClr val="tx1"/>
+            </a:fontRef>
+          </p:style>
+        </p:cxnSp>
+        <p:sp>
+          <p:nvSpPr>
+            <p:cNvPr id="156" name="Rounded Rectangle 155"/>
+            <p:cNvSpPr/>
+            <p:nvPr/>
+          </p:nvSpPr>
+          <p:spPr>
+            <a:xfrm>
+              <a:off x="3801979" y="22186232"/>
+              <a:ext cx="1780674" cy="1291565"/>
+            </a:xfrm>
+            <a:prstGeom prst="roundRect">
+              <a:avLst/>
+            </a:prstGeom>
+            <a:noFill/>
+          </p:spPr>
+          <p:style>
+            <a:lnRef idx="2">
+              <a:schemeClr val="accent1">
+                <a:shade val="50000"/>
+              </a:schemeClr>
+            </a:lnRef>
+            <a:fillRef idx="1">
+              <a:schemeClr val="accent1"/>
+            </a:fillRef>
+            <a:effectRef idx="0">
+              <a:schemeClr val="accent1"/>
+            </a:effectRef>
+            <a:fontRef idx="minor">
+              <a:schemeClr val="lt1"/>
+            </a:fontRef>
+          </p:style>
+          <p:txBody>
+            <a:bodyPr rtlCol="0" anchor="ctr"/>
+            <a:lstStyle/>
+            <a:p>
+              <a:pPr algn="ctr"/>
+              <a:r>
+                <a:rPr lang="en-US" sz="5116" dirty="0" err="1">
+                  <a:solidFill>
+                    <a:srgbClr val="FFC000"/>
+                  </a:solidFill>
+                </a:rPr>
+                <a:t>Src</a:t>
+              </a:r>
+              <a:r>
+                <a:rPr lang="en-US" sz="5116" dirty="0">
+                  <a:solidFill>
+                    <a:srgbClr val="FFC000"/>
+                  </a:solidFill>
+                </a:rPr>
+                <a:t>. </a:t>
+              </a:r>
+              <a:r>
+                <a:rPr lang="en-US" sz="5116" dirty="0">
+                  <a:solidFill>
+                    <a:srgbClr val="FFC000"/>
+                  </a:solidFill>
+                </a:rPr>
+                <a:t>B</a:t>
+              </a:r>
+              <a:endParaRPr lang="en-US" sz="5116" dirty="0">
+                <a:solidFill>
+                  <a:srgbClr val="FFC000"/>
+                </a:solidFill>
+              </a:endParaRPr>
+            </a:p>
+          </p:txBody>
+        </p:sp>
+        <p:cxnSp>
+          <p:nvCxnSpPr>
+            <p:cNvPr id="157" name="Straight Connector 156"/>
+            <p:cNvCxnSpPr/>
+            <p:nvPr/>
+          </p:nvCxnSpPr>
+          <p:spPr>
+            <a:xfrm flipH="1">
+              <a:off x="10090485" y="23477797"/>
+              <a:ext cx="48126" cy="3617319"/>
+            </a:xfrm>
+            <a:prstGeom prst="line">
+              <a:avLst/>
+            </a:prstGeom>
+          </p:spPr>
+          <p:style>
+            <a:lnRef idx="1">
+              <a:schemeClr val="accent1"/>
+            </a:lnRef>
+            <a:fillRef idx="0">
+              <a:schemeClr val="accent1"/>
+            </a:fillRef>
+            <a:effectRef idx="0">
+              <a:schemeClr val="accent1"/>
+            </a:effectRef>
+            <a:fontRef idx="minor">
+              <a:schemeClr val="tx1"/>
+            </a:fontRef>
+          </p:style>
+        </p:cxnSp>
+        <p:sp>
+          <p:nvSpPr>
+            <p:cNvPr id="158" name="Rounded Rectangle 157"/>
+            <p:cNvSpPr/>
+            <p:nvPr/>
+          </p:nvSpPr>
+          <p:spPr>
+            <a:xfrm>
+              <a:off x="9248274" y="22186232"/>
+              <a:ext cx="1780674" cy="1291565"/>
+            </a:xfrm>
+            <a:prstGeom prst="roundRect">
+              <a:avLst/>
+            </a:prstGeom>
+            <a:noFill/>
+            <a:ln>
+              <a:solidFill>
+                <a:srgbClr val="00B050"/>
+              </a:solidFill>
+            </a:ln>
+          </p:spPr>
+          <p:style>
+            <a:lnRef idx="2">
+              <a:schemeClr val="accent1">
+                <a:shade val="50000"/>
+              </a:schemeClr>
+            </a:lnRef>
+            <a:fillRef idx="1">
+              <a:schemeClr val="accent1"/>
+            </a:fillRef>
+            <a:effectRef idx="0">
+              <a:schemeClr val="accent1"/>
+            </a:effectRef>
+            <a:fontRef idx="minor">
+              <a:schemeClr val="lt1"/>
+            </a:fontRef>
+          </p:style>
+          <p:txBody>
+            <a:bodyPr rtlCol="0" anchor="ctr"/>
+            <a:lstStyle/>
+            <a:p>
+              <a:pPr algn="ctr"/>
+              <a:r>
+                <a:rPr lang="en-US" sz="5116" dirty="0">
+                  <a:solidFill>
+                    <a:srgbClr val="00B050"/>
+                  </a:solidFill>
+                </a:rPr>
+                <a:t>Des. A</a:t>
+              </a:r>
+              <a:endParaRPr lang="en-US" sz="5116" dirty="0">
+                <a:solidFill>
+                  <a:srgbClr val="00B050"/>
+                </a:solidFill>
+              </a:endParaRPr>
+            </a:p>
+          </p:txBody>
+        </p:sp>
+        <p:sp>
+          <p:nvSpPr>
+            <p:cNvPr id="159" name="Rounded Rectangle 158"/>
+            <p:cNvSpPr/>
+            <p:nvPr/>
+          </p:nvSpPr>
+          <p:spPr>
+            <a:xfrm>
+              <a:off x="3801979" y="27095116"/>
+              <a:ext cx="1780674" cy="1291565"/>
+            </a:xfrm>
+            <a:prstGeom prst="roundRect">
+              <a:avLst/>
+            </a:prstGeom>
+            <a:noFill/>
+          </p:spPr>
+          <p:style>
+            <a:lnRef idx="2">
+              <a:schemeClr val="accent1">
+                <a:shade val="50000"/>
+              </a:schemeClr>
+            </a:lnRef>
+            <a:fillRef idx="1">
+              <a:schemeClr val="accent1"/>
+            </a:fillRef>
+            <a:effectRef idx="0">
+              <a:schemeClr val="accent1"/>
+            </a:effectRef>
+            <a:fontRef idx="minor">
+              <a:schemeClr val="lt1"/>
+            </a:fontRef>
+          </p:style>
+          <p:txBody>
+            <a:bodyPr rtlCol="0" anchor="ctr"/>
+            <a:lstStyle/>
+            <a:p>
+              <a:pPr algn="ctr"/>
+              <a:r>
+                <a:rPr lang="en-US" sz="5116" dirty="0" err="1">
+                  <a:ln>
+                    <a:solidFill>
+                      <a:srgbClr val="00B050"/>
+                    </a:solidFill>
+                  </a:ln>
+                  <a:solidFill>
+                    <a:schemeClr val="accent6">
+                      <a:lumMod val="75000"/>
+                    </a:schemeClr>
+                  </a:solidFill>
+                </a:rPr>
+                <a:t>Src</a:t>
+              </a:r>
+              <a:r>
+                <a:rPr lang="en-US" sz="5116" dirty="0">
+                  <a:ln>
+                    <a:solidFill>
+                      <a:srgbClr val="00B050"/>
+                    </a:solidFill>
+                  </a:ln>
+                  <a:solidFill>
+                    <a:schemeClr val="accent6">
+                      <a:lumMod val="75000"/>
+                    </a:schemeClr>
+                  </a:solidFill>
+                </a:rPr>
+                <a:t>. A</a:t>
+              </a:r>
+              <a:endParaRPr lang="en-US" sz="5116" dirty="0">
+                <a:ln>
+                  <a:solidFill>
+                    <a:srgbClr val="00B050"/>
+                  </a:solidFill>
+                </a:ln>
+                <a:solidFill>
+                  <a:schemeClr val="accent6">
+                    <a:lumMod val="75000"/>
+                  </a:schemeClr>
+                </a:solidFill>
+              </a:endParaRPr>
+            </a:p>
+          </p:txBody>
+        </p:sp>
+        <p:sp>
+          <p:nvSpPr>
+            <p:cNvPr id="160" name="Rounded Rectangle 159"/>
+            <p:cNvSpPr/>
+            <p:nvPr/>
+          </p:nvSpPr>
+          <p:spPr>
+            <a:xfrm>
+              <a:off x="9248274" y="27095116"/>
+              <a:ext cx="1780674" cy="1291565"/>
+            </a:xfrm>
+            <a:prstGeom prst="roundRect">
+              <a:avLst/>
+            </a:prstGeom>
+            <a:noFill/>
+          </p:spPr>
+          <p:style>
+            <a:lnRef idx="2">
+              <a:schemeClr val="accent1">
+                <a:shade val="50000"/>
+              </a:schemeClr>
+            </a:lnRef>
+            <a:fillRef idx="1">
+              <a:schemeClr val="accent1"/>
+            </a:fillRef>
+            <a:effectRef idx="0">
+              <a:schemeClr val="accent1"/>
+            </a:effectRef>
+            <a:fontRef idx="minor">
+              <a:schemeClr val="lt1"/>
+            </a:fontRef>
+          </p:style>
+          <p:txBody>
+            <a:bodyPr rtlCol="0" anchor="ctr"/>
+            <a:lstStyle/>
+            <a:p>
+              <a:pPr algn="ctr"/>
+              <a:r>
+                <a:rPr lang="en-US" sz="5116" dirty="0">
+                  <a:solidFill>
+                    <a:srgbClr val="FFC000"/>
+                  </a:solidFill>
+                </a:rPr>
+                <a:t>Des. B</a:t>
+              </a:r>
+              <a:endParaRPr lang="en-US" sz="5116" dirty="0">
+                <a:solidFill>
+                  <a:srgbClr val="FFC000"/>
+                </a:solidFill>
+              </a:endParaRPr>
+            </a:p>
+          </p:txBody>
+        </p:sp>
+        <p:cxnSp>
+          <p:nvCxnSpPr>
+            <p:cNvPr id="161" name="Straight Connector 160"/>
+            <p:cNvCxnSpPr>
+              <a:stCxn id="156" idx="3"/>
+              <a:endCxn id="158" idx="1"/>
+            </p:cNvCxnSpPr>
+            <p:nvPr/>
+          </p:nvCxnSpPr>
+          <p:spPr>
+            <a:xfrm>
+              <a:off x="5582653" y="22832015"/>
+              <a:ext cx="3665621" cy="0"/>
+            </a:xfrm>
+            <a:prstGeom prst="line">
+              <a:avLst/>
+            </a:prstGeom>
+          </p:spPr>
+          <p:style>
+            <a:lnRef idx="1">
+              <a:schemeClr val="accent1"/>
+            </a:lnRef>
+            <a:fillRef idx="0">
+              <a:schemeClr val="accent1"/>
+            </a:fillRef>
+            <a:effectRef idx="0">
+              <a:schemeClr val="accent1"/>
+            </a:effectRef>
+            <a:fontRef idx="minor">
+              <a:schemeClr val="tx1"/>
+            </a:fontRef>
+          </p:style>
+        </p:cxnSp>
+        <p:cxnSp>
+          <p:nvCxnSpPr>
+            <p:cNvPr id="162" name="Straight Connector 161"/>
+            <p:cNvCxnSpPr/>
+            <p:nvPr/>
+          </p:nvCxnSpPr>
+          <p:spPr>
+            <a:xfrm>
+              <a:off x="5582653" y="27740506"/>
+              <a:ext cx="3665621" cy="0"/>
+            </a:xfrm>
+            <a:prstGeom prst="line">
+              <a:avLst/>
+            </a:prstGeom>
+          </p:spPr>
+          <p:style>
+            <a:lnRef idx="1">
+              <a:schemeClr val="accent1"/>
+            </a:lnRef>
+            <a:fillRef idx="0">
+              <a:schemeClr val="accent1"/>
+            </a:fillRef>
+            <a:effectRef idx="0">
+              <a:schemeClr val="accent1"/>
+            </a:effectRef>
+            <a:fontRef idx="minor">
+              <a:schemeClr val="tx1"/>
+            </a:fontRef>
+          </p:style>
+        </p:cxnSp>
+        <p:sp>
+          <p:nvSpPr>
+            <p:cNvPr id="163" name="TextBox 162"/>
+            <p:cNvSpPr txBox="1"/>
+            <p:nvPr/>
+          </p:nvSpPr>
+          <p:spPr>
+            <a:xfrm>
+              <a:off x="6240380" y="22247240"/>
+              <a:ext cx="3007894" cy="455864"/>
+            </a:xfrm>
+            <a:prstGeom prst="rect">
+              <a:avLst/>
+            </a:prstGeom>
+            <a:noFill/>
+          </p:spPr>
+          <p:txBody>
+            <a:bodyPr wrap="square" rtlCol="0">
+              <a:spAutoFit/>
+            </a:bodyPr>
+            <a:lstStyle/>
+            <a:p>
+              <a:pPr algn="ctr"/>
+              <a:r>
+                <a:rPr lang="en-US" sz="3032" dirty="0">
+                  <a:solidFill>
+                    <a:schemeClr val="accent5"/>
+                  </a:solidFill>
+                </a:rPr>
+                <a:t>Eth @100Mbps</a:t>
+              </a:r>
+              <a:endParaRPr lang="en-US" sz="3032" dirty="0">
+                <a:solidFill>
+                  <a:schemeClr val="accent5"/>
+                </a:solidFill>
+              </a:endParaRPr>
+            </a:p>
+          </p:txBody>
+        </p:sp>
+        <p:sp>
+          <p:nvSpPr>
+            <p:cNvPr id="164" name="TextBox 163"/>
+            <p:cNvSpPr txBox="1"/>
+            <p:nvPr/>
+          </p:nvSpPr>
+          <p:spPr>
+            <a:xfrm>
+              <a:off x="6182269" y="27888036"/>
+              <a:ext cx="3007894" cy="455864"/>
+            </a:xfrm>
+            <a:prstGeom prst="rect">
+              <a:avLst/>
+            </a:prstGeom>
+            <a:noFill/>
+          </p:spPr>
+          <p:txBody>
+            <a:bodyPr wrap="square" rtlCol="0">
+              <a:spAutoFit/>
+            </a:bodyPr>
+            <a:lstStyle/>
+            <a:p>
+              <a:pPr algn="ctr"/>
+              <a:r>
+                <a:rPr lang="en-US" sz="3032" dirty="0">
+                  <a:solidFill>
+                    <a:schemeClr val="accent5"/>
+                  </a:solidFill>
+                </a:rPr>
+                <a:t>Eth @100Mbps</a:t>
+              </a:r>
+              <a:endParaRPr lang="en-US" sz="3032" dirty="0">
+                <a:solidFill>
+                  <a:schemeClr val="accent5"/>
+                </a:solidFill>
+              </a:endParaRPr>
+            </a:p>
+          </p:txBody>
+        </p:sp>
+        <p:sp>
+          <p:nvSpPr>
+            <p:cNvPr id="165" name="TextBox 164"/>
+            <p:cNvSpPr txBox="1"/>
+            <p:nvPr/>
+          </p:nvSpPr>
+          <p:spPr>
+            <a:xfrm rot="5400000">
+              <a:off x="9104051" y="25042733"/>
+              <a:ext cx="3007894" cy="487446"/>
+            </a:xfrm>
+            <a:prstGeom prst="rect">
+              <a:avLst/>
+            </a:prstGeom>
+            <a:noFill/>
+          </p:spPr>
+          <p:txBody>
+            <a:bodyPr wrap="square" rtlCol="0">
+              <a:spAutoFit/>
+            </a:bodyPr>
+            <a:lstStyle/>
+            <a:p>
+              <a:pPr algn="ctr"/>
+              <a:r>
+                <a:rPr lang="en-US" sz="3032" dirty="0" err="1">
+                  <a:solidFill>
+                    <a:schemeClr val="accent5"/>
+                  </a:solidFill>
+                </a:rPr>
+                <a:t>Wifi</a:t>
+              </a:r>
+              <a:r>
+                <a:rPr lang="en-US" sz="3032" dirty="0">
+                  <a:solidFill>
+                    <a:schemeClr val="accent5"/>
+                  </a:solidFill>
+                </a:rPr>
+                <a:t> </a:t>
+              </a:r>
+              <a:r>
+                <a:rPr lang="en-US" sz="3032" dirty="0">
+                  <a:solidFill>
+                    <a:schemeClr val="accent5"/>
+                  </a:solidFill>
+                </a:rPr>
+                <a:t>@100Mbps</a:t>
+              </a:r>
+              <a:endParaRPr lang="en-US" sz="3032" dirty="0">
+                <a:solidFill>
+                  <a:schemeClr val="accent5"/>
+                </a:solidFill>
+              </a:endParaRPr>
+            </a:p>
+          </p:txBody>
+        </p:sp>
+        <p:sp>
+          <p:nvSpPr>
+            <p:cNvPr id="166" name="TextBox 165"/>
+            <p:cNvSpPr txBox="1"/>
+            <p:nvPr/>
+          </p:nvSpPr>
+          <p:spPr>
+            <a:xfrm rot="16200000">
+              <a:off x="2787077" y="24846456"/>
+              <a:ext cx="3007894" cy="487446"/>
+            </a:xfrm>
+            <a:prstGeom prst="rect">
+              <a:avLst/>
+            </a:prstGeom>
+            <a:noFill/>
+          </p:spPr>
+          <p:txBody>
+            <a:bodyPr wrap="square" rtlCol="0">
+              <a:spAutoFit/>
+            </a:bodyPr>
+            <a:lstStyle/>
+            <a:p>
+              <a:pPr algn="ctr"/>
+              <a:r>
+                <a:rPr lang="en-US" sz="3032" dirty="0" err="1">
+                  <a:solidFill>
+                    <a:schemeClr val="accent5"/>
+                  </a:solidFill>
+                </a:rPr>
+                <a:t>Wifi</a:t>
+              </a:r>
+              <a:r>
+                <a:rPr lang="en-US" sz="3032" dirty="0">
+                  <a:solidFill>
+                    <a:schemeClr val="accent5"/>
+                  </a:solidFill>
+                </a:rPr>
+                <a:t> </a:t>
+              </a:r>
+              <a:r>
+                <a:rPr lang="en-US" sz="3032" dirty="0">
+                  <a:solidFill>
+                    <a:schemeClr val="accent5"/>
+                  </a:solidFill>
+                </a:rPr>
+                <a:t>@100Mbps</a:t>
+              </a:r>
+              <a:endParaRPr lang="en-US" sz="3032" dirty="0">
+                <a:solidFill>
+                  <a:schemeClr val="accent5"/>
+                </a:solidFill>
+              </a:endParaRPr>
+            </a:p>
+          </p:txBody>
+        </p:sp>
+      </p:grpSp>
+      <p:cxnSp>
+        <p:nvCxnSpPr>
+          <p:cNvPr id="10" name="Straight Arrow Connector 9"/>
+          <p:cNvCxnSpPr/>
+          <p:nvPr/>
+        </p:nvCxnSpPr>
+        <p:spPr>
+          <a:xfrm>
+            <a:off x="16399781" y="21699738"/>
+            <a:ext cx="2306455" cy="0"/>
+          </a:xfrm>
+          <a:prstGeom prst="straightConnector1">
+            <a:avLst/>
+          </a:prstGeom>
+          <a:ln w="76200">
+            <a:solidFill>
+              <a:srgbClr val="FFC000"/>
+            </a:solidFill>
+            <a:tailEnd type="triangle"/>
+          </a:ln>
+        </p:spPr>
+        <p:style>
+          <a:lnRef idx="1">
+            <a:schemeClr val="accent1"/>
+          </a:lnRef>
+          <a:fillRef idx="0">
+            <a:schemeClr val="accent1"/>
+          </a:fillRef>
+          <a:effectRef idx="0">
+            <a:schemeClr val="accent1"/>
+          </a:effectRef>
+          <a:fontRef idx="minor">
+            <a:schemeClr val="tx1"/>
+          </a:fontRef>
+        </p:style>
+      </p:cxnSp>
+      <p:cxnSp>
+        <p:nvCxnSpPr>
+          <p:cNvPr id="168" name="Straight Arrow Connector 167"/>
+          <p:cNvCxnSpPr/>
+          <p:nvPr/>
+        </p:nvCxnSpPr>
+        <p:spPr>
+          <a:xfrm>
+            <a:off x="16399781" y="21494567"/>
+            <a:ext cx="2306455" cy="0"/>
+          </a:xfrm>
+          <a:prstGeom prst="straightConnector1">
+            <a:avLst/>
+          </a:prstGeom>
+          <a:ln w="76200">
+            <a:solidFill>
+              <a:srgbClr val="00B050"/>
+            </a:solidFill>
+            <a:tailEnd type="triangle"/>
+          </a:ln>
+        </p:spPr>
+        <p:style>
+          <a:lnRef idx="1">
+            <a:schemeClr val="accent1"/>
+          </a:lnRef>
+          <a:fillRef idx="0">
+            <a:schemeClr val="accent1"/>
+          </a:fillRef>
+          <a:effectRef idx="0">
+            <a:schemeClr val="accent1"/>
+          </a:effectRef>
+          <a:fontRef idx="minor">
+            <a:schemeClr val="tx1"/>
+          </a:fontRef>
+        </p:style>
+      </p:cxnSp>
+      <p:cxnSp>
+        <p:nvCxnSpPr>
+          <p:cNvPr id="169" name="Straight Arrow Connector 168"/>
+          <p:cNvCxnSpPr/>
+          <p:nvPr/>
+        </p:nvCxnSpPr>
+        <p:spPr>
+          <a:xfrm>
+            <a:off x="16523602" y="27638635"/>
+            <a:ext cx="2306455" cy="0"/>
+          </a:xfrm>
+          <a:prstGeom prst="straightConnector1">
+            <a:avLst/>
+          </a:prstGeom>
+          <a:ln w="76200">
+            <a:solidFill>
+              <a:srgbClr val="FFC000"/>
+            </a:solidFill>
+            <a:tailEnd type="triangle"/>
+          </a:ln>
+        </p:spPr>
+        <p:style>
+          <a:lnRef idx="1">
+            <a:schemeClr val="accent1"/>
+          </a:lnRef>
+          <a:fillRef idx="0">
+            <a:schemeClr val="accent1"/>
+          </a:fillRef>
+          <a:effectRef idx="0">
+            <a:schemeClr val="accent1"/>
+          </a:effectRef>
+          <a:fontRef idx="minor">
+            <a:schemeClr val="tx1"/>
+          </a:fontRef>
+        </p:style>
+      </p:cxnSp>
+      <p:cxnSp>
+        <p:nvCxnSpPr>
+          <p:cNvPr id="170" name="Straight Arrow Connector 169"/>
+          <p:cNvCxnSpPr/>
+          <p:nvPr/>
+        </p:nvCxnSpPr>
+        <p:spPr>
+          <a:xfrm>
+            <a:off x="16523602" y="27502357"/>
+            <a:ext cx="2306455" cy="0"/>
+          </a:xfrm>
+          <a:prstGeom prst="straightConnector1">
+            <a:avLst/>
+          </a:prstGeom>
+          <a:ln w="76200">
+            <a:solidFill>
+              <a:srgbClr val="00B050"/>
+            </a:solidFill>
+            <a:tailEnd type="triangle"/>
+          </a:ln>
+        </p:spPr>
+        <p:style>
+          <a:lnRef idx="1">
+            <a:schemeClr val="accent1"/>
+          </a:lnRef>
+          <a:fillRef idx="0">
+            <a:schemeClr val="accent1"/>
+          </a:fillRef>
+          <a:effectRef idx="0">
+            <a:schemeClr val="accent1"/>
+          </a:effectRef>
+          <a:fontRef idx="minor">
+            <a:schemeClr val="tx1"/>
+          </a:fontRef>
+        </p:style>
+      </p:cxnSp>
+      <p:cxnSp>
+        <p:nvCxnSpPr>
+          <p:cNvPr id="171" name="Straight Arrow Connector 170"/>
+          <p:cNvCxnSpPr/>
+          <p:nvPr/>
+        </p:nvCxnSpPr>
+        <p:spPr>
+          <a:xfrm>
+            <a:off x="20706819" y="23144456"/>
+            <a:ext cx="0" cy="1835599"/>
+          </a:xfrm>
+          <a:prstGeom prst="straightConnector1">
+            <a:avLst/>
+          </a:prstGeom>
+          <a:ln w="76200">
+            <a:solidFill>
+              <a:srgbClr val="FFC000"/>
+            </a:solidFill>
+            <a:tailEnd type="triangle"/>
+          </a:ln>
+        </p:spPr>
+        <p:style>
+          <a:lnRef idx="1">
+            <a:schemeClr val="accent1"/>
+          </a:lnRef>
+          <a:fillRef idx="0">
+            <a:schemeClr val="accent1"/>
+          </a:fillRef>
+          <a:effectRef idx="0">
+            <a:schemeClr val="accent1"/>
+          </a:effectRef>
+          <a:fontRef idx="minor">
+            <a:schemeClr val="tx1"/>
+          </a:fontRef>
+        </p:style>
+      </p:cxnSp>
+      <p:cxnSp>
+        <p:nvCxnSpPr>
+          <p:cNvPr id="172" name="Straight Arrow Connector 171"/>
+          <p:cNvCxnSpPr/>
+          <p:nvPr/>
+        </p:nvCxnSpPr>
+        <p:spPr>
+          <a:xfrm>
+            <a:off x="20524447" y="23144455"/>
+            <a:ext cx="0" cy="1829195"/>
+          </a:xfrm>
+          <a:prstGeom prst="straightConnector1">
+            <a:avLst/>
+          </a:prstGeom>
+          <a:ln w="76200">
+            <a:solidFill>
+              <a:srgbClr val="00B050"/>
+            </a:solidFill>
+            <a:headEnd type="triangle" w="med" len="med"/>
+            <a:tailEnd type="none" w="med" len="med"/>
+          </a:ln>
+        </p:spPr>
+        <p:style>
+          <a:lnRef idx="1">
+            <a:schemeClr val="accent1"/>
+          </a:lnRef>
+          <a:fillRef idx="0">
+            <a:schemeClr val="accent1"/>
+          </a:fillRef>
+          <a:effectRef idx="0">
+            <a:schemeClr val="accent1"/>
+          </a:effectRef>
+          <a:fontRef idx="minor">
+            <a:schemeClr val="tx1"/>
+          </a:fontRef>
+        </p:style>
+      </p:cxnSp>
+      <p:cxnSp>
+        <p:nvCxnSpPr>
+          <p:cNvPr id="176" name="Straight Arrow Connector 175"/>
+          <p:cNvCxnSpPr/>
+          <p:nvPr/>
+        </p:nvCxnSpPr>
+        <p:spPr>
+          <a:xfrm>
+            <a:off x="14228762" y="23217856"/>
+            <a:ext cx="0" cy="1835599"/>
+          </a:xfrm>
+          <a:prstGeom prst="straightConnector1">
+            <a:avLst/>
+          </a:prstGeom>
+          <a:ln w="76200">
+            <a:solidFill>
+              <a:srgbClr val="FFC000"/>
+            </a:solidFill>
+            <a:tailEnd type="triangle"/>
+          </a:ln>
+        </p:spPr>
+        <p:style>
+          <a:lnRef idx="1">
+            <a:schemeClr val="accent1"/>
+          </a:lnRef>
+          <a:fillRef idx="0">
+            <a:schemeClr val="accent1"/>
+          </a:fillRef>
+          <a:effectRef idx="0">
+            <a:schemeClr val="accent1"/>
+          </a:effectRef>
+          <a:fontRef idx="minor">
+            <a:schemeClr val="tx1"/>
+          </a:fontRef>
+        </p:style>
+      </p:cxnSp>
+      <p:cxnSp>
+        <p:nvCxnSpPr>
+          <p:cNvPr id="177" name="Straight Arrow Connector 176"/>
+          <p:cNvCxnSpPr/>
+          <p:nvPr/>
+        </p:nvCxnSpPr>
+        <p:spPr>
+          <a:xfrm>
+            <a:off x="14046390" y="23217856"/>
+            <a:ext cx="0" cy="1829195"/>
+          </a:xfrm>
+          <a:prstGeom prst="straightConnector1">
+            <a:avLst/>
+          </a:prstGeom>
+          <a:ln w="76200">
+            <a:solidFill>
+              <a:srgbClr val="00B050"/>
+            </a:solidFill>
+            <a:headEnd type="triangle" w="med" len="med"/>
+            <a:tailEnd type="none" w="med" len="med"/>
+          </a:ln>
+        </p:spPr>
+        <p:style>
+          <a:lnRef idx="1">
+            <a:schemeClr val="accent1"/>
+          </a:lnRef>
+          <a:fillRef idx="0">
+            <a:schemeClr val="accent1"/>
+          </a:fillRef>
+          <a:effectRef idx="0">
+            <a:schemeClr val="accent1"/>
+          </a:effectRef>
+          <a:fontRef idx="minor">
+            <a:schemeClr val="tx1"/>
+          </a:fontRef>
+        </p:style>
+      </p:cxnSp>
+      <p:sp>
+        <p:nvSpPr>
+          <p:cNvPr id="20" name="Rectangle 19"/>
+          <p:cNvSpPr/>
+          <p:nvPr/>
+        </p:nvSpPr>
+        <p:spPr>
+          <a:xfrm>
+            <a:off x="17494447" y="23343368"/>
+            <a:ext cx="2555086" cy="437442"/>
+          </a:xfrm>
+          <a:prstGeom prst="rect">
+            <a:avLst/>
+          </a:prstGeom>
+          <a:noFill/>
+        </p:spPr>
+        <p:txBody>
+          <a:bodyPr wrap="none" lIns="86627" tIns="43314" rIns="86627" bIns="43314">
+            <a:spAutoFit/>
+          </a:bodyPr>
+          <a:lstStyle/>
+          <a:p>
+            <a:pPr algn="ctr"/>
+            <a:r>
+              <a:rPr lang="en-US" sz="2274" dirty="0">
+                <a:ln w="0"/>
+                <a:solidFill>
+                  <a:schemeClr val="accent1"/>
+                </a:solidFill>
+                <a:effectLst>
+                  <a:outerShdw blurRad="38100" dist="25400" dir="5400000" algn="ctr" rotWithShape="0">
+                    <a:srgbClr val="6E747A">
+                      <a:alpha val="43000"/>
+                    </a:srgbClr>
+                  </a:outerShdw>
+                </a:effectLst>
+              </a:rPr>
+              <a:t>Possible Traffic Flow</a:t>
+            </a:r>
+            <a:endParaRPr lang="en-US" sz="2274" dirty="0">
+              <a:ln w="0"/>
+              <a:solidFill>
+                <a:schemeClr val="accent1"/>
+              </a:solidFill>
+              <a:effectLst>
+                <a:outerShdw blurRad="38100" dist="25400" dir="5400000" algn="ctr" rotWithShape="0">
+                  <a:srgbClr val="6E747A">
+                    <a:alpha val="43000"/>
+                  </a:srgbClr>
+                </a:outerShdw>
+              </a:effectLst>
+            </a:endParaRPr>
+          </a:p>
+        </p:txBody>
+      </p:sp>
+      <p:cxnSp>
+        <p:nvCxnSpPr>
+          <p:cNvPr id="22" name="Straight Arrow Connector 21"/>
+          <p:cNvCxnSpPr/>
+          <p:nvPr/>
+        </p:nvCxnSpPr>
+        <p:spPr>
+          <a:xfrm flipH="1">
+            <a:off x="17693261" y="23785082"/>
+            <a:ext cx="711603" cy="586216"/>
+          </a:xfrm>
+          <a:prstGeom prst="straightConnector1">
+            <a:avLst/>
+          </a:prstGeom>
+          <a:ln w="76200">
+            <a:tailEnd type="triangle"/>
+          </a:ln>
+        </p:spPr>
+        <p:style>
+          <a:lnRef idx="1">
+            <a:schemeClr val="accent1"/>
+          </a:lnRef>
+          <a:fillRef idx="0">
+            <a:schemeClr val="accent1"/>
+          </a:fillRef>
+          <a:effectRef idx="0">
+            <a:schemeClr val="accent1"/>
+          </a:effectRef>
+          <a:fontRef idx="minor">
+            <a:schemeClr val="tx1"/>
+          </a:fontRef>
+        </p:style>
+      </p:cxnSp>
+      <p:sp>
+        <p:nvSpPr>
+          <p:cNvPr id="28" name="TextBox 27"/>
+          <p:cNvSpPr txBox="1"/>
+          <p:nvPr/>
+        </p:nvSpPr>
+        <p:spPr>
+          <a:xfrm>
+            <a:off x="15058190" y="28010420"/>
+            <a:ext cx="4859673" cy="617220"/>
+          </a:xfrm>
+          <a:prstGeom prst="rect">
+            <a:avLst/>
+          </a:prstGeom>
+          <a:noFill/>
+        </p:spPr>
+        <p:txBody>
+          <a:bodyPr wrap="square" rtlCol="0">
+            <a:spAutoFit/>
+          </a:bodyPr>
+          <a:lstStyle/>
+          <a:p>
+            <a:pPr algn="ctr"/>
+            <a:r>
+              <a:rPr lang="en-US" sz="3411" i="1" dirty="0"/>
+              <a:t>Figure 3</a:t>
+            </a:r>
+            <a:endParaRPr lang="en-US" sz="3411" i="1" dirty="0"/>
+          </a:p>
+        </p:txBody>
+      </p:sp>
+      <p:sp>
+        <p:nvSpPr>
+          <p:cNvPr id="187" name="TextBox 186"/>
+          <p:cNvSpPr txBox="1"/>
+          <p:nvPr/>
+        </p:nvSpPr>
+        <p:spPr>
+          <a:xfrm>
+            <a:off x="15685805" y="26282636"/>
+            <a:ext cx="3144252" cy="529697"/>
+          </a:xfrm>
+          <a:prstGeom prst="rect">
+            <a:avLst/>
+          </a:prstGeom>
+          <a:noFill/>
+        </p:spPr>
+        <p:txBody>
+          <a:bodyPr wrap="square" rtlCol="0">
+            <a:spAutoFit/>
+          </a:bodyPr>
+          <a:lstStyle/>
+          <a:p>
+            <a:pPr algn="ctr"/>
+            <a:r>
+              <a:rPr lang="en-IN" sz="2842" i="1" dirty="0"/>
+              <a:t>Graph 2</a:t>
+            </a:r>
+            <a:endParaRPr lang="en-IN" sz="2842" i="1" dirty="0"/>
+          </a:p>
+        </p:txBody>
+      </p:sp>
+      <p:sp>
+        <p:nvSpPr>
+          <p:cNvPr id="260" name="TextBox 259"/>
+          <p:cNvSpPr txBox="1"/>
+          <p:nvPr/>
+        </p:nvSpPr>
+        <p:spPr>
+          <a:xfrm flipH="1">
+            <a:off x="31910908" y="12877559"/>
+            <a:ext cx="9351384" cy="1258806"/>
+          </a:xfrm>
+          <a:prstGeom prst="rect">
+            <a:avLst/>
+          </a:prstGeom>
+          <a:noFill/>
+        </p:spPr>
+        <p:txBody>
+          <a:bodyPr wrap="square" rtlCol="0">
+            <a:spAutoFit/>
+          </a:bodyPr>
+          <a:lstStyle/>
+          <a:p>
+            <a:pPr algn="ctr"/>
+            <a:r>
+              <a:rPr lang="en-US" sz="3790" b="1" dirty="0"/>
+              <a:t>*N sub-flows MPTCP v/s *N number of </a:t>
+            </a:r>
+            <a:r>
+              <a:rPr lang="en-US" sz="3790" b="1" dirty="0"/>
+              <a:t>TCP on Single Path</a:t>
+            </a:r>
+            <a:endParaRPr lang="en-US" sz="3032" b="1" dirty="0"/>
+          </a:p>
+        </p:txBody>
+      </p:sp>
+      <p:sp>
+        <p:nvSpPr>
+          <p:cNvPr id="5" name="TextBox 4"/>
+          <p:cNvSpPr txBox="1"/>
+          <p:nvPr/>
+        </p:nvSpPr>
+        <p:spPr>
+          <a:xfrm>
+            <a:off x="12779932" y="29011763"/>
+            <a:ext cx="9351384" cy="1842043"/>
+          </a:xfrm>
+          <a:prstGeom prst="rect">
+            <a:avLst/>
+          </a:prstGeom>
+          <a:noFill/>
+        </p:spPr>
+        <p:txBody>
+          <a:bodyPr wrap="square" rtlCol="0">
+            <a:spAutoFit/>
+          </a:bodyPr>
+          <a:lstStyle/>
+          <a:p>
+            <a:pPr algn="just"/>
+            <a:r>
+              <a:rPr lang="en-US" sz="3790" dirty="0"/>
+              <a:t>MPTCP utilized full capacity of the resources (i.e. throughput) on available paths as compared to TCP connection.</a:t>
+            </a:r>
+            <a:endParaRPr lang="en-US" sz="3790" dirty="0"/>
+          </a:p>
+        </p:txBody>
+      </p:sp>
+      <p:sp>
+        <p:nvSpPr>
+          <p:cNvPr id="79" name="TextBox 78"/>
+          <p:cNvSpPr txBox="1"/>
+          <p:nvPr/>
+        </p:nvSpPr>
+        <p:spPr>
+          <a:xfrm>
+            <a:off x="40633430" y="17484248"/>
+            <a:ext cx="950903" cy="267317"/>
+          </a:xfrm>
+          <a:prstGeom prst="rect">
+            <a:avLst/>
+          </a:prstGeom>
+          <a:noFill/>
+        </p:spPr>
+        <p:txBody>
+          <a:bodyPr wrap="square" rtlCol="0">
+            <a:spAutoFit/>
+          </a:bodyPr>
+          <a:lstStyle/>
+          <a:p>
+            <a:r>
+              <a:rPr lang="en-US" sz="1137" dirty="0" err="1">
+                <a:latin typeface="Verdana" panose="020B0604030504040204" pitchFamily="34" charset="0"/>
+                <a:ea typeface="Verdana" panose="020B0604030504040204" pitchFamily="34" charset="0"/>
+                <a:cs typeface="Verdana" panose="020B0604030504040204" pitchFamily="34" charset="0"/>
+              </a:rPr>
+              <a:t>K</a:t>
+            </a:r>
+            <a:r>
+              <a:rPr lang="en-US" sz="1137" dirty="0" err="1">
+                <a:latin typeface="Verdana" panose="020B0604030504040204" pitchFamily="34" charset="0"/>
+                <a:ea typeface="Verdana" panose="020B0604030504040204" pitchFamily="34" charset="0"/>
+                <a:cs typeface="Verdana" panose="020B0604030504040204" pitchFamily="34" charset="0"/>
+              </a:rPr>
+              <a:t>Bps</a:t>
+            </a:r>
+            <a:endParaRPr lang="en-US" sz="1326" dirty="0">
+              <a:latin typeface="Verdana" panose="020B0604030504040204" pitchFamily="34" charset="0"/>
+              <a:ea typeface="Verdana" panose="020B0604030504040204" pitchFamily="34" charset="0"/>
+              <a:cs typeface="Verdana" panose="020B0604030504040204" pitchFamily="34" charset="0"/>
+            </a:endParaRPr>
+          </a:p>
+        </p:txBody>
+      </p:sp>
+      <p:sp>
+        <p:nvSpPr>
+          <p:cNvPr id="80" name="TextBox 79"/>
+          <p:cNvSpPr txBox="1"/>
+          <p:nvPr/>
+        </p:nvSpPr>
+        <p:spPr>
+          <a:xfrm>
+            <a:off x="40633430" y="17682769"/>
+            <a:ext cx="950903" cy="267317"/>
+          </a:xfrm>
+          <a:prstGeom prst="rect">
+            <a:avLst/>
+          </a:prstGeom>
+          <a:noFill/>
+        </p:spPr>
+        <p:txBody>
+          <a:bodyPr wrap="square" rtlCol="0">
+            <a:spAutoFit/>
+          </a:bodyPr>
+          <a:lstStyle/>
+          <a:p>
+            <a:r>
+              <a:rPr lang="en-US" sz="1137" dirty="0" err="1">
+                <a:latin typeface="Verdana" panose="020B0604030504040204" pitchFamily="34" charset="0"/>
+                <a:ea typeface="Verdana" panose="020B0604030504040204" pitchFamily="34" charset="0"/>
+                <a:cs typeface="Verdana" panose="020B0604030504040204" pitchFamily="34" charset="0"/>
+              </a:rPr>
+              <a:t>K</a:t>
+            </a:r>
+            <a:r>
+              <a:rPr lang="en-US" sz="1137" dirty="0" err="1">
+                <a:latin typeface="Verdana" panose="020B0604030504040204" pitchFamily="34" charset="0"/>
+                <a:ea typeface="Verdana" panose="020B0604030504040204" pitchFamily="34" charset="0"/>
+                <a:cs typeface="Verdana" panose="020B0604030504040204" pitchFamily="34" charset="0"/>
+              </a:rPr>
+              <a:t>Bps</a:t>
+            </a:r>
+            <a:endParaRPr lang="en-US" sz="1137" dirty="0">
+              <a:latin typeface="Verdana" panose="020B0604030504040204" pitchFamily="34" charset="0"/>
+              <a:ea typeface="Verdana" panose="020B0604030504040204" pitchFamily="34" charset="0"/>
+              <a:cs typeface="Verdana" panose="020B0604030504040204" pitchFamily="34" charset="0"/>
+            </a:endParaRPr>
+          </a:p>
+        </p:txBody>
+      </p:sp>
+      <p:sp>
+        <p:nvSpPr>
+          <p:cNvPr id="83" name="TextBox 82"/>
+          <p:cNvSpPr txBox="1"/>
+          <p:nvPr/>
+        </p:nvSpPr>
+        <p:spPr>
+          <a:xfrm>
+            <a:off x="40767896" y="17858599"/>
+            <a:ext cx="950903" cy="267317"/>
+          </a:xfrm>
+          <a:prstGeom prst="rect">
+            <a:avLst/>
+          </a:prstGeom>
+          <a:noFill/>
+        </p:spPr>
+        <p:txBody>
+          <a:bodyPr wrap="square" rtlCol="0">
+            <a:spAutoFit/>
+          </a:bodyPr>
+          <a:lstStyle/>
+          <a:p>
+            <a:r>
+              <a:rPr lang="en-US" sz="1137" dirty="0" err="1">
+                <a:latin typeface="Verdana" panose="020B0604030504040204" pitchFamily="34" charset="0"/>
+                <a:ea typeface="Verdana" panose="020B0604030504040204" pitchFamily="34" charset="0"/>
+                <a:cs typeface="Verdana" panose="020B0604030504040204" pitchFamily="34" charset="0"/>
+              </a:rPr>
+              <a:t>KBps</a:t>
+            </a:r>
+            <a:endParaRPr lang="en-US" sz="1137" dirty="0">
+              <a:latin typeface="Verdana" panose="020B0604030504040204" pitchFamily="34" charset="0"/>
+              <a:ea typeface="Verdana" panose="020B0604030504040204" pitchFamily="34" charset="0"/>
+              <a:cs typeface="Verdana" panose="020B0604030504040204" pitchFamily="34" charset="0"/>
+            </a:endParaRPr>
+          </a:p>
+        </p:txBody>
+      </p:sp>
     </p:spTree>
     <p:extLst>
       <p:ext uri="{BB962C8B-B14F-4D97-AF65-F5344CB8AC3E}">
@@ -4288,7 +7015,7 @@
     </a:clrScheme>
     <a:fontScheme name="Office Theme">
       <a:majorFont>
-        <a:latin typeface="Calibri Light"/>
+        <a:latin typeface="Calibri Light" panose="020F0302020204030204"/>
         <a:ea typeface=""/>
         <a:cs typeface=""/>
         <a:font script="Jpan" typeface="ＭＳ Ｐゴシック"/>
@@ -4323,7 +7050,7 @@
         <a:font script="Geor" typeface="Sylfaen"/>
       </a:majorFont>
       <a:minorFont>
-        <a:latin typeface="Calibri"/>
+        <a:latin typeface="Calibri" panose="020F0502020204030204"/>
         <a:ea typeface=""/>
         <a:cs typeface=""/>
         <a:font script="Jpan" typeface="ＭＳ Ｐゴシック"/>

</xml_diff>